<commit_message>
PYTHON : Title slides updated [1]
PYTHON : Title slides updated[1]
</commit_message>
<xml_diff>
--- a/python/python-abhishek/08__PYTHON-NumPy.pptx
+++ b/python/python-abhishek/08__PYTHON-NumPy.pptx
@@ -196,7 +196,7 @@
   </p:defaultTextStyle>
   <p:extLst>
     <p:ext uri="{EFAFB233-063F-42B5-8137-9DF3F51BA10A}">
-      <p15:sldGuideLst xmlns:p15="http://schemas.microsoft.com/office/powerpoint/2012/main">
+      <p15:sldGuideLst xmlns:p15="http://schemas.microsoft.com/office/powerpoint/2012/main" xmlns="">
         <p15:guide id="1" orient="horz" pos="2160">
           <p15:clr>
             <a:srgbClr val="A4A3A4"/>
@@ -210,7 +210,7 @@
       </p15:sldGuideLst>
     </p:ext>
     <p:ext uri="{2D200454-40CA-4A62-9FC3-DE9A4176ACB9}">
-      <p15:notesGuideLst xmlns:p15="http://schemas.microsoft.com/office/powerpoint/2012/main">
+      <p15:notesGuideLst xmlns:p15="http://schemas.microsoft.com/office/powerpoint/2012/main" xmlns="">
         <p15:guide id="1" orient="horz" pos="3024">
           <p15:clr>
             <a:srgbClr val="A4A3A4"/>
@@ -229,71 +229,32 @@
 
 <file path=ppt/commentAuthors.xml><?xml version="1.0" encoding="utf-8"?>
 <p:cmAuthorLst xmlns:a="http://schemas.openxmlformats.org/drawingml/2006/main" xmlns:r="http://schemas.openxmlformats.org/officeDocument/2006/relationships" xmlns:p="http://schemas.openxmlformats.org/presentationml/2006/main">
-  <p:cmAuthor id="43" name="Abishek" initials="AR [38]" lastIdx="1" clrIdx="42">
-    <p:extLst/>
-  </p:cmAuthor>
   <p:cmAuthor id="1" name="Mary Conlee" initials="MC" lastIdx="1" clrIdx="0"/>
-  <p:cmAuthor id="44" name="Abishek" initials="AR [39]" lastIdx="1" clrIdx="43">
-    <p:extLst/>
-  </p:cmAuthor>
   <p:cmAuthor id="2" name="Mark Kerzner" initials="MK" lastIdx="6" clrIdx="1"/>
-  <p:cmAuthor id="45" name="Abishek" initials="AR [40]" lastIdx="1" clrIdx="44">
-    <p:extLst/>
-  </p:cmAuthor>
   <p:cmAuthor id="3" name="Mary Beth Conlee" initials="MBC" lastIdx="7" clrIdx="2"/>
-  <p:cmAuthor id="46" name="Abishek" initials="AR [41]" lastIdx="1" clrIdx="45">
-    <p:extLst/>
-  </p:cmAuthor>
   <p:cmAuthor id="4" name="Michelle" initials="M" lastIdx="5" clrIdx="3"/>
-  <p:cmAuthor id="47" name="Abishek" initials="AR [42]" lastIdx="1" clrIdx="46">
-    <p:extLst/>
-  </p:cmAuthor>
   <p:cmAuthor id="5" name="Tricia Murphy" initials="TM" lastIdx="4" clrIdx="4">
-    <p:extLst/>
-  </p:cmAuthor>
-  <p:cmAuthor id="48" name="Abishek" initials="AR [43]" lastIdx="1" clrIdx="47">
     <p:extLst/>
   </p:cmAuthor>
   <p:cmAuthor id="6" name="Abishek" initials="AR" lastIdx="1" clrIdx="5">
     <p:extLst/>
   </p:cmAuthor>
-  <p:cmAuthor id="49" name="Abishek" initials="AR [44]" lastIdx="1" clrIdx="48">
-    <p:extLst/>
-  </p:cmAuthor>
   <p:cmAuthor id="7" name="Abishek" initials="AR [2]" lastIdx="1" clrIdx="6">
-    <p:extLst/>
-  </p:cmAuthor>
-  <p:cmAuthor id="50" name="Abishek" initials="AR [45]" lastIdx="1" clrIdx="49">
     <p:extLst/>
   </p:cmAuthor>
   <p:cmAuthor id="8" name="Abishek" initials="AR [3]" lastIdx="1" clrIdx="7">
     <p:extLst/>
   </p:cmAuthor>
-  <p:cmAuthor id="51" name="Abishek" initials="AR [46]" lastIdx="1" clrIdx="50">
-    <p:extLst/>
-  </p:cmAuthor>
   <p:cmAuthor id="9" name="Abishek" initials="AR [4]" lastIdx="1" clrIdx="8">
-    <p:extLst/>
-  </p:cmAuthor>
-  <p:cmAuthor id="52" name="Abishek" initials="AR [47]" lastIdx="1" clrIdx="51">
     <p:extLst/>
   </p:cmAuthor>
   <p:cmAuthor id="10" name="Abishek" initials="AR [5]" lastIdx="1" clrIdx="9">
     <p:extLst/>
   </p:cmAuthor>
-  <p:cmAuthor id="53" name="Abishek" initials="AR [48]" lastIdx="1" clrIdx="52">
-    <p:extLst/>
-  </p:cmAuthor>
   <p:cmAuthor id="11" name="Abishek" initials="AR [6]" lastIdx="1" clrIdx="10">
     <p:extLst/>
   </p:cmAuthor>
-  <p:cmAuthor id="54" name="Abishek" initials="AR [49]" lastIdx="1" clrIdx="53">
-    <p:extLst/>
-  </p:cmAuthor>
   <p:cmAuthor id="12" name="Abishek" initials="AR [7]" lastIdx="1" clrIdx="11">
-    <p:extLst/>
-  </p:cmAuthor>
-  <p:cmAuthor id="55" name="Abishek" initials="AR [50]" lastIdx="1" clrIdx="54">
     <p:extLst/>
   </p:cmAuthor>
   <p:cmAuthor id="13" name="Abishek" initials="AR [8]" lastIdx="1" clrIdx="12">
@@ -386,6 +347,45 @@
   <p:cmAuthor id="42" name="Abishek" initials="AR [37]" lastIdx="1" clrIdx="41">
     <p:extLst/>
   </p:cmAuthor>
+  <p:cmAuthor id="43" name="Abishek" initials="AR [38]" lastIdx="1" clrIdx="42">
+    <p:extLst/>
+  </p:cmAuthor>
+  <p:cmAuthor id="44" name="Abishek" initials="AR [39]" lastIdx="1" clrIdx="43">
+    <p:extLst/>
+  </p:cmAuthor>
+  <p:cmAuthor id="45" name="Abishek" initials="AR [40]" lastIdx="1" clrIdx="44">
+    <p:extLst/>
+  </p:cmAuthor>
+  <p:cmAuthor id="46" name="Abishek" initials="AR [41]" lastIdx="1" clrIdx="45">
+    <p:extLst/>
+  </p:cmAuthor>
+  <p:cmAuthor id="47" name="Abishek" initials="AR [42]" lastIdx="1" clrIdx="46">
+    <p:extLst/>
+  </p:cmAuthor>
+  <p:cmAuthor id="48" name="Abishek" initials="AR [43]" lastIdx="1" clrIdx="47">
+    <p:extLst/>
+  </p:cmAuthor>
+  <p:cmAuthor id="49" name="Abishek" initials="AR [44]" lastIdx="1" clrIdx="48">
+    <p:extLst/>
+  </p:cmAuthor>
+  <p:cmAuthor id="50" name="Abishek" initials="AR [45]" lastIdx="1" clrIdx="49">
+    <p:extLst/>
+  </p:cmAuthor>
+  <p:cmAuthor id="51" name="Abishek" initials="AR [46]" lastIdx="1" clrIdx="50">
+    <p:extLst/>
+  </p:cmAuthor>
+  <p:cmAuthor id="52" name="Abishek" initials="AR [47]" lastIdx="1" clrIdx="51">
+    <p:extLst/>
+  </p:cmAuthor>
+  <p:cmAuthor id="53" name="Abishek" initials="AR [48]" lastIdx="1" clrIdx="52">
+    <p:extLst/>
+  </p:cmAuthor>
+  <p:cmAuthor id="54" name="Abishek" initials="AR [49]" lastIdx="1" clrIdx="53">
+    <p:extLst/>
+  </p:cmAuthor>
+  <p:cmAuthor id="55" name="Abishek" initials="AR [50]" lastIdx="1" clrIdx="54">
+    <p:extLst/>
+  </p:cmAuthor>
 </p:cmAuthorLst>
 </file>
 
@@ -396,7 +396,7 @@
     <p:text>Slide addition at this location - Corrected headers</p:text>
     <p:extLst>
       <p:ext uri="{C676402C-5697-4E1C-873F-D02D1690AC5C}">
-        <p15:threadingInfo xmlns:p15="http://schemas.microsoft.com/office/powerpoint/2012/main" timeZoneBias="420"/>
+        <p15:threadingInfo xmlns:p15="http://schemas.microsoft.com/office/powerpoint/2012/main" xmlns="" timeZoneBias="420"/>
       </p:ext>
     </p:extLst>
   </p:cm>
@@ -410,7 +410,7 @@
     <p:text>Code Snippet Consistency - (Input: Pink + Bold with arrows), (Output: Black + Non-Bold)</p:text>
     <p:extLst>
       <p:ext uri="{C676402C-5697-4E1C-873F-D02D1690AC5C}">
-        <p15:threadingInfo xmlns:p15="http://schemas.microsoft.com/office/powerpoint/2012/main" timeZoneBias="420"/>
+        <p15:threadingInfo xmlns:p15="http://schemas.microsoft.com/office/powerpoint/2012/main" xmlns="" timeZoneBias="420"/>
       </p:ext>
     </p:extLst>
   </p:cm>
@@ -424,7 +424,7 @@
     <p:text>Minor edits - formatting changes, more examples with verified outputs from python 3. There are many ways to create arrays. More are on the next slide</p:text>
     <p:extLst>
       <p:ext uri="{C676402C-5697-4E1C-873F-D02D1690AC5C}">
-        <p15:threadingInfo xmlns:p15="http://schemas.microsoft.com/office/powerpoint/2012/main" timeZoneBias="420"/>
+        <p15:threadingInfo xmlns:p15="http://schemas.microsoft.com/office/powerpoint/2012/main" xmlns="" timeZoneBias="420"/>
       </p:ext>
     </p:extLst>
   </p:cm>
@@ -434,7 +434,7 @@
 </p:text>
     <p:extLst>
       <p:ext uri="{C676402C-5697-4E1C-873F-D02D1690AC5C}">
-        <p15:threadingInfo xmlns:p15="http://schemas.microsoft.com/office/powerpoint/2012/main" timeZoneBias="420"/>
+        <p15:threadingInfo xmlns:p15="http://schemas.microsoft.com/office/powerpoint/2012/main" xmlns="" timeZoneBias="420"/>
       </p:ext>
     </p:extLst>
   </p:cm>
@@ -448,7 +448,7 @@
     <p:text>Slide addition at this location - Code for numpy zeros, ones, arange, linespace (All for Creating Arrays) and hence under the Creating Arrays subset</p:text>
     <p:extLst>
       <p:ext uri="{C676402C-5697-4E1C-873F-D02D1690AC5C}">
-        <p15:threadingInfo xmlns:p15="http://schemas.microsoft.com/office/powerpoint/2012/main" timeZoneBias="420"/>
+        <p15:threadingInfo xmlns:p15="http://schemas.microsoft.com/office/powerpoint/2012/main" xmlns="" timeZoneBias="420"/>
       </p:ext>
     </p:extLst>
   </p:cm>
@@ -462,7 +462,7 @@
     <p:text>Defining new functions like reshape and shape. Previous version talks about arange when the students haven't been introduced to the syntax of arange </p:text>
     <p:extLst>
       <p:ext uri="{C676402C-5697-4E1C-873F-D02D1690AC5C}">
-        <p15:threadingInfo xmlns:p15="http://schemas.microsoft.com/office/powerpoint/2012/main" timeZoneBias="420"/>
+        <p15:threadingInfo xmlns:p15="http://schemas.microsoft.com/office/powerpoint/2012/main" xmlns="" timeZoneBias="420"/>
       </p:ext>
     </p:extLst>
   </p:cm>
@@ -471,7 +471,7 @@
     <p:text>Code Snippet Consistency - (Input: Pink + Bold with arrows), (Output: Black + Non-Bold)</p:text>
     <p:extLst>
       <p:ext uri="{C676402C-5697-4E1C-873F-D02D1690AC5C}">
-        <p15:threadingInfo xmlns:p15="http://schemas.microsoft.com/office/powerpoint/2012/main" timeZoneBias="420"/>
+        <p15:threadingInfo xmlns:p15="http://schemas.microsoft.com/office/powerpoint/2012/main" xmlns="" timeZoneBias="420"/>
       </p:ext>
     </p:extLst>
   </p:cm>
@@ -485,7 +485,7 @@
     <p:text>Slide removal from this location - slide has been added previously</p:text>
     <p:extLst>
       <p:ext uri="{C676402C-5697-4E1C-873F-D02D1690AC5C}">
-        <p15:threadingInfo xmlns:p15="http://schemas.microsoft.com/office/powerpoint/2012/main" timeZoneBias="420"/>
+        <p15:threadingInfo xmlns:p15="http://schemas.microsoft.com/office/powerpoint/2012/main" xmlns="" timeZoneBias="420"/>
       </p:ext>
     </p:extLst>
   </p:cm>
@@ -499,7 +499,7 @@
     <p:text>Minor edits - formatting changes, more examples with verified outputs from python 3</p:text>
     <p:extLst>
       <p:ext uri="{C676402C-5697-4E1C-873F-D02D1690AC5C}">
-        <p15:threadingInfo xmlns:p15="http://schemas.microsoft.com/office/powerpoint/2012/main" timeZoneBias="420"/>
+        <p15:threadingInfo xmlns:p15="http://schemas.microsoft.com/office/powerpoint/2012/main" xmlns="" timeZoneBias="420"/>
       </p:ext>
     </p:extLst>
   </p:cm>
@@ -508,7 +508,7 @@
     <p:text>Code Snippet Consistency - (Input: Pink + Bold with arrows), (Output: Black + Non-Bold)</p:text>
     <p:extLst>
       <p:ext uri="{C676402C-5697-4E1C-873F-D02D1690AC5C}">
-        <p15:threadingInfo xmlns:p15="http://schemas.microsoft.com/office/powerpoint/2012/main" timeZoneBias="420"/>
+        <p15:threadingInfo xmlns:p15="http://schemas.microsoft.com/office/powerpoint/2012/main" xmlns="" timeZoneBias="420"/>
       </p:ext>
     </p:extLst>
   </p:cm>
@@ -522,7 +522,7 @@
     <p:text>Minor edits - more examples of Upcasting with verified outputs from python 3</p:text>
     <p:extLst>
       <p:ext uri="{C676402C-5697-4E1C-873F-D02D1690AC5C}">
-        <p15:threadingInfo xmlns:p15="http://schemas.microsoft.com/office/powerpoint/2012/main" timeZoneBias="420"/>
+        <p15:threadingInfo xmlns:p15="http://schemas.microsoft.com/office/powerpoint/2012/main" xmlns="" timeZoneBias="420"/>
       </p:ext>
     </p:extLst>
   </p:cm>
@@ -536,7 +536,7 @@
     <p:text>Edits - Essential scenarios for broadcasting explained in a more lucid manner</p:text>
     <p:extLst>
       <p:ext uri="{C676402C-5697-4E1C-873F-D02D1690AC5C}">
-        <p15:threadingInfo xmlns:p15="http://schemas.microsoft.com/office/powerpoint/2012/main" timeZoneBias="420"/>
+        <p15:threadingInfo xmlns:p15="http://schemas.microsoft.com/office/powerpoint/2012/main" xmlns="" timeZoneBias="420"/>
       </p:ext>
     </p:extLst>
   </p:cm>
@@ -550,7 +550,7 @@
     <p:text>Minor edits - more examples of Broadcasting with verified outputs from python 3</p:text>
     <p:extLst>
       <p:ext uri="{C676402C-5697-4E1C-873F-D02D1690AC5C}">
-        <p15:threadingInfo xmlns:p15="http://schemas.microsoft.com/office/powerpoint/2012/main" timeZoneBias="420"/>
+        <p15:threadingInfo xmlns:p15="http://schemas.microsoft.com/office/powerpoint/2012/main" xmlns="" timeZoneBias="420"/>
       </p:ext>
     </p:extLst>
   </p:cm>
@@ -564,7 +564,7 @@
     <p:text>Code Snippet Consistency - (Input: Pink + Bold with arrows), (Output: Black + Non-Bold)</p:text>
     <p:extLst>
       <p:ext uri="{C676402C-5697-4E1C-873F-D02D1690AC5C}">
-        <p15:threadingInfo xmlns:p15="http://schemas.microsoft.com/office/powerpoint/2012/main" timeZoneBias="420"/>
+        <p15:threadingInfo xmlns:p15="http://schemas.microsoft.com/office/powerpoint/2012/main" xmlns="" timeZoneBias="420"/>
       </p:ext>
     </p:extLst>
   </p:cm>
@@ -578,7 +578,7 @@
     <p:text>Slide addition at this location - no lesson objectives were present</p:text>
     <p:extLst>
       <p:ext uri="{C676402C-5697-4E1C-873F-D02D1690AC5C}">
-        <p15:threadingInfo xmlns:p15="http://schemas.microsoft.com/office/powerpoint/2012/main" timeZoneBias="420"/>
+        <p15:threadingInfo xmlns:p15="http://schemas.microsoft.com/office/powerpoint/2012/main" xmlns="" timeZoneBias="420"/>
       </p:ext>
     </p:extLst>
   </p:cm>
@@ -592,7 +592,7 @@
     <p:text>Improved clarity in code</p:text>
     <p:extLst>
       <p:ext uri="{C676402C-5697-4E1C-873F-D02D1690AC5C}">
-        <p15:threadingInfo xmlns:p15="http://schemas.microsoft.com/office/powerpoint/2012/main" timeZoneBias="420"/>
+        <p15:threadingInfo xmlns:p15="http://schemas.microsoft.com/office/powerpoint/2012/main" xmlns="" timeZoneBias="420"/>
       </p:ext>
     </p:extLst>
   </p:cm>
@@ -601,7 +601,7 @@
     <p:text>Code Snippet Consistency - (Input: Pink + Bold with arrows), (Output: Black + Non-Bold)</p:text>
     <p:extLst>
       <p:ext uri="{C676402C-5697-4E1C-873F-D02D1690AC5C}">
-        <p15:threadingInfo xmlns:p15="http://schemas.microsoft.com/office/powerpoint/2012/main" timeZoneBias="420"/>
+        <p15:threadingInfo xmlns:p15="http://schemas.microsoft.com/office/powerpoint/2012/main" xmlns="" timeZoneBias="420"/>
       </p:ext>
     </p:extLst>
   </p:cm>
@@ -615,7 +615,7 @@
     <p:text>Slide addition at this location - Header for more advanced statistical operations, appending, deleting, filtering elements etc</p:text>
     <p:extLst>
       <p:ext uri="{C676402C-5697-4E1C-873F-D02D1690AC5C}">
-        <p15:threadingInfo xmlns:p15="http://schemas.microsoft.com/office/powerpoint/2012/main" timeZoneBias="420"/>
+        <p15:threadingInfo xmlns:p15="http://schemas.microsoft.com/office/powerpoint/2012/main" xmlns="" timeZoneBias="420"/>
       </p:ext>
     </p:extLst>
   </p:cm>
@@ -629,7 +629,7 @@
     <p:text>Slide removal from this location - slide has been added previously / kind of redundant</p:text>
     <p:extLst>
       <p:ext uri="{C676402C-5697-4E1C-873F-D02D1690AC5C}">
-        <p15:threadingInfo xmlns:p15="http://schemas.microsoft.com/office/powerpoint/2012/main" timeZoneBias="420"/>
+        <p15:threadingInfo xmlns:p15="http://schemas.microsoft.com/office/powerpoint/2012/main" xmlns="" timeZoneBias="420"/>
       </p:ext>
     </p:extLst>
   </p:cm>
@@ -643,7 +643,7 @@
     <p:text>Slide removal from this location - slide has been added previously / kind of redundant</p:text>
     <p:extLst>
       <p:ext uri="{C676402C-5697-4E1C-873F-D02D1690AC5C}">
-        <p15:threadingInfo xmlns:p15="http://schemas.microsoft.com/office/powerpoint/2012/main" timeZoneBias="420"/>
+        <p15:threadingInfo xmlns:p15="http://schemas.microsoft.com/office/powerpoint/2012/main" xmlns="" timeZoneBias="420"/>
       </p:ext>
     </p:extLst>
   </p:cm>
@@ -657,7 +657,7 @@
     <p:text>Edits - formatting changes, more examples with verified outputs from python 3</p:text>
     <p:extLst>
       <p:ext uri="{C676402C-5697-4E1C-873F-D02D1690AC5C}">
-        <p15:threadingInfo xmlns:p15="http://schemas.microsoft.com/office/powerpoint/2012/main" timeZoneBias="420"/>
+        <p15:threadingInfo xmlns:p15="http://schemas.microsoft.com/office/powerpoint/2012/main" xmlns="" timeZoneBias="420"/>
       </p:ext>
     </p:extLst>
   </p:cm>
@@ -667,7 +667,7 @@
 </p:text>
     <p:extLst>
       <p:ext uri="{C676402C-5697-4E1C-873F-D02D1690AC5C}">
-        <p15:threadingInfo xmlns:p15="http://schemas.microsoft.com/office/powerpoint/2012/main" timeZoneBias="420"/>
+        <p15:threadingInfo xmlns:p15="http://schemas.microsoft.com/office/powerpoint/2012/main" xmlns="" timeZoneBias="420"/>
       </p:ext>
     </p:extLst>
   </p:cm>
@@ -681,7 +681,7 @@
     <p:text>Edits - formatting changes, more examples with verified outputs from python 3</p:text>
     <p:extLst>
       <p:ext uri="{C676402C-5697-4E1C-873F-D02D1690AC5C}">
-        <p15:threadingInfo xmlns:p15="http://schemas.microsoft.com/office/powerpoint/2012/main" timeZoneBias="420"/>
+        <p15:threadingInfo xmlns:p15="http://schemas.microsoft.com/office/powerpoint/2012/main" xmlns="" timeZoneBias="420"/>
       </p:ext>
     </p:extLst>
   </p:cm>
@@ -690,7 +690,7 @@
     <p:text>Reversing and Sorting compiled onto one slide. Appending and Deleting compiled onto adjacent slide</p:text>
     <p:extLst>
       <p:ext uri="{C676402C-5697-4E1C-873F-D02D1690AC5C}">
-        <p15:threadingInfo xmlns:p15="http://schemas.microsoft.com/office/powerpoint/2012/main" timeZoneBias="420"/>
+        <p15:threadingInfo xmlns:p15="http://schemas.microsoft.com/office/powerpoint/2012/main" xmlns="" timeZoneBias="420"/>
       </p:ext>
     </p:extLst>
   </p:cm>
@@ -700,7 +700,7 @@
 </p:text>
     <p:extLst>
       <p:ext uri="{C676402C-5697-4E1C-873F-D02D1690AC5C}">
-        <p15:threadingInfo xmlns:p15="http://schemas.microsoft.com/office/powerpoint/2012/main" timeZoneBias="420"/>
+        <p15:threadingInfo xmlns:p15="http://schemas.microsoft.com/office/powerpoint/2012/main" xmlns="" timeZoneBias="420"/>
       </p:ext>
     </p:extLst>
   </p:cm>
@@ -714,7 +714,7 @@
     <p:text>Edits - formatting changes, more examples with verified outputs from python 3</p:text>
     <p:extLst>
       <p:ext uri="{C676402C-5697-4E1C-873F-D02D1690AC5C}">
-        <p15:threadingInfo xmlns:p15="http://schemas.microsoft.com/office/powerpoint/2012/main" timeZoneBias="420"/>
+        <p15:threadingInfo xmlns:p15="http://schemas.microsoft.com/office/powerpoint/2012/main" xmlns="" timeZoneBias="420"/>
       </p:ext>
     </p:extLst>
   </p:cm>
@@ -723,7 +723,7 @@
     <p:text>Reversing and Sorting compiled onto one slide. Appending and Deleting compiled onto adjacent slide</p:text>
     <p:extLst>
       <p:ext uri="{C676402C-5697-4E1C-873F-D02D1690AC5C}">
-        <p15:threadingInfo xmlns:p15="http://schemas.microsoft.com/office/powerpoint/2012/main" timeZoneBias="420"/>
+        <p15:threadingInfo xmlns:p15="http://schemas.microsoft.com/office/powerpoint/2012/main" xmlns="" timeZoneBias="420"/>
       </p:ext>
     </p:extLst>
   </p:cm>
@@ -733,7 +733,7 @@
 </p:text>
     <p:extLst>
       <p:ext uri="{C676402C-5697-4E1C-873F-D02D1690AC5C}">
-        <p15:threadingInfo xmlns:p15="http://schemas.microsoft.com/office/powerpoint/2012/main" timeZoneBias="420"/>
+        <p15:threadingInfo xmlns:p15="http://schemas.microsoft.com/office/powerpoint/2012/main" xmlns="" timeZoneBias="420"/>
       </p:ext>
     </p:extLst>
   </p:cm>
@@ -747,7 +747,7 @@
     <p:text>Edits - Key operations np.any() and np.all() were not explained with filter. Have been added with verified examples in python</p:text>
     <p:extLst>
       <p:ext uri="{C676402C-5697-4E1C-873F-D02D1690AC5C}">
-        <p15:threadingInfo xmlns:p15="http://schemas.microsoft.com/office/powerpoint/2012/main" timeZoneBias="420"/>
+        <p15:threadingInfo xmlns:p15="http://schemas.microsoft.com/office/powerpoint/2012/main" xmlns="" timeZoneBias="420"/>
       </p:ext>
     </p:extLst>
   </p:cm>
@@ -761,7 +761,7 @@
     <p:text>Slide addition at this location - Matrices are different from arrays - need new header</p:text>
     <p:extLst>
       <p:ext uri="{C676402C-5697-4E1C-873F-D02D1690AC5C}">
-        <p15:threadingInfo xmlns:p15="http://schemas.microsoft.com/office/powerpoint/2012/main" timeZoneBias="420"/>
+        <p15:threadingInfo xmlns:p15="http://schemas.microsoft.com/office/powerpoint/2012/main" xmlns="" timeZoneBias="420"/>
       </p:ext>
     </p:extLst>
   </p:cm>
@@ -775,7 +775,7 @@
     <p:text>Minor edits - Just chose a consistent 1,2,3,4 example and formatted</p:text>
     <p:extLst>
       <p:ext uri="{C676402C-5697-4E1C-873F-D02D1690AC5C}">
-        <p15:threadingInfo xmlns:p15="http://schemas.microsoft.com/office/powerpoint/2012/main" timeZoneBias="420"/>
+        <p15:threadingInfo xmlns:p15="http://schemas.microsoft.com/office/powerpoint/2012/main" xmlns="" timeZoneBias="420"/>
       </p:ext>
     </p:extLst>
   </p:cm>
@@ -785,7 +785,7 @@
 </p:text>
     <p:extLst>
       <p:ext uri="{C676402C-5697-4E1C-873F-D02D1690AC5C}">
-        <p15:threadingInfo xmlns:p15="http://schemas.microsoft.com/office/powerpoint/2012/main" timeZoneBias="420"/>
+        <p15:threadingInfo xmlns:p15="http://schemas.microsoft.com/office/powerpoint/2012/main" xmlns="" timeZoneBias="420"/>
       </p:ext>
     </p:extLst>
   </p:cm>
@@ -799,7 +799,7 @@
     <p:text>Slide addition at this location - Now, a new header is needed for introduction</p:text>
     <p:extLst>
       <p:ext uri="{C676402C-5697-4E1C-873F-D02D1690AC5C}">
-        <p15:threadingInfo xmlns:p15="http://schemas.microsoft.com/office/powerpoint/2012/main" timeZoneBias="420"/>
+        <p15:threadingInfo xmlns:p15="http://schemas.microsoft.com/office/powerpoint/2012/main" xmlns="" timeZoneBias="420"/>
       </p:ext>
     </p:extLst>
   </p:cm>
@@ -813,7 +813,7 @@
     <p:text>Edits - Removed stuff not relevant to python 3.* and added more examples with verified outputs in python 3</p:text>
     <p:extLst>
       <p:ext uri="{C676402C-5697-4E1C-873F-D02D1690AC5C}">
-        <p15:threadingInfo xmlns:p15="http://schemas.microsoft.com/office/powerpoint/2012/main" timeZoneBias="420"/>
+        <p15:threadingInfo xmlns:p15="http://schemas.microsoft.com/office/powerpoint/2012/main" xmlns="" timeZoneBias="420"/>
       </p:ext>
     </p:extLst>
   </p:cm>
@@ -822,7 +822,7 @@
     <p:text>Code Snippet Consistency - (Input: Pink + Bold with arrows), (Output: Black + Non-Bold)</p:text>
     <p:extLst>
       <p:ext uri="{C676402C-5697-4E1C-873F-D02D1690AC5C}">
-        <p15:threadingInfo xmlns:p15="http://schemas.microsoft.com/office/powerpoint/2012/main" timeZoneBias="420"/>
+        <p15:threadingInfo xmlns:p15="http://schemas.microsoft.com/office/powerpoint/2012/main" xmlns="" timeZoneBias="420"/>
       </p:ext>
     </p:extLst>
   </p:cm>
@@ -836,7 +836,7 @@
     <p:text>Slide addition at this location - Basics like determinant, inverse were not present. Added</p:text>
     <p:extLst>
       <p:ext uri="{C676402C-5697-4E1C-873F-D02D1690AC5C}">
-        <p15:threadingInfo xmlns:p15="http://schemas.microsoft.com/office/powerpoint/2012/main" timeZoneBias="420"/>
+        <p15:threadingInfo xmlns:p15="http://schemas.microsoft.com/office/powerpoint/2012/main" xmlns="" timeZoneBias="420"/>
       </p:ext>
     </p:extLst>
   </p:cm>
@@ -845,7 +845,7 @@
     <p:text>Code Snippet Consistency - (Input: Pink + Bold with arrows), (Output: Black + Non-Bold)</p:text>
     <p:extLst>
       <p:ext uri="{C676402C-5697-4E1C-873F-D02D1690AC5C}">
-        <p15:threadingInfo xmlns:p15="http://schemas.microsoft.com/office/powerpoint/2012/main" timeZoneBias="420"/>
+        <p15:threadingInfo xmlns:p15="http://schemas.microsoft.com/office/powerpoint/2012/main" xmlns="" timeZoneBias="420"/>
       </p:ext>
     </p:extLst>
   </p:cm>
@@ -859,7 +859,7 @@
     <p:text>Code Snippet Consistency - (Input: Pink + Bold with arrows), (Output: Black + Non-Bold)</p:text>
     <p:extLst>
       <p:ext uri="{C676402C-5697-4E1C-873F-D02D1690AC5C}">
-        <p15:threadingInfo xmlns:p15="http://schemas.microsoft.com/office/powerpoint/2012/main" timeZoneBias="420"/>
+        <p15:threadingInfo xmlns:p15="http://schemas.microsoft.com/office/powerpoint/2012/main" xmlns="" timeZoneBias="420"/>
       </p:ext>
     </p:extLst>
   </p:cm>
@@ -873,7 +873,7 @@
     <p:text>Slide removal from this location - slide will be included in Scipy. It is a part of Scipy</p:text>
     <p:extLst>
       <p:ext uri="{C676402C-5697-4E1C-873F-D02D1690AC5C}">
-        <p15:threadingInfo xmlns:p15="http://schemas.microsoft.com/office/powerpoint/2012/main" timeZoneBias="420"/>
+        <p15:threadingInfo xmlns:p15="http://schemas.microsoft.com/office/powerpoint/2012/main" xmlns="" timeZoneBias="420"/>
       </p:ext>
     </p:extLst>
   </p:cm>
@@ -887,7 +887,7 @@
     <p:text>Slide removal from this location - slide will be included in Scipy. It is a part of Scipy</p:text>
     <p:extLst>
       <p:ext uri="{C676402C-5697-4E1C-873F-D02D1690AC5C}">
-        <p15:threadingInfo xmlns:p15="http://schemas.microsoft.com/office/powerpoint/2012/main" timeZoneBias="420"/>
+        <p15:threadingInfo xmlns:p15="http://schemas.microsoft.com/office/powerpoint/2012/main" xmlns="" timeZoneBias="420"/>
       </p:ext>
     </p:extLst>
   </p:cm>
@@ -901,7 +901,7 @@
     <p:text>Lab numbers were not at all matching with slides - This is a different convention now, but it can be easily modified to your previous convention</p:text>
     <p:extLst>
       <p:ext uri="{C676402C-5697-4E1C-873F-D02D1690AC5C}">
-        <p15:threadingInfo xmlns:p15="http://schemas.microsoft.com/office/powerpoint/2012/main" timeZoneBias="420"/>
+        <p15:threadingInfo xmlns:p15="http://schemas.microsoft.com/office/powerpoint/2012/main" xmlns="" timeZoneBias="420"/>
       </p:ext>
     </p:extLst>
   </p:cm>
@@ -915,7 +915,7 @@
     <p:text>Slide addition at this location - Review Questions</p:text>
     <p:extLst>
       <p:ext uri="{C676402C-5697-4E1C-873F-D02D1690AC5C}">
-        <p15:threadingInfo xmlns:p15="http://schemas.microsoft.com/office/powerpoint/2012/main" timeZoneBias="420"/>
+        <p15:threadingInfo xmlns:p15="http://schemas.microsoft.com/office/powerpoint/2012/main" xmlns="" timeZoneBias="420"/>
       </p:ext>
     </p:extLst>
   </p:cm>
@@ -929,7 +929,7 @@
     <p:text>Slide removal permanently - kind of redundant with the Python slides. We are talking about Numpy here</p:text>
     <p:extLst>
       <p:ext uri="{C676402C-5697-4E1C-873F-D02D1690AC5C}">
-        <p15:threadingInfo xmlns:p15="http://schemas.microsoft.com/office/powerpoint/2012/main" timeZoneBias="420"/>
+        <p15:threadingInfo xmlns:p15="http://schemas.microsoft.com/office/powerpoint/2012/main" xmlns="" timeZoneBias="420"/>
       </p:ext>
     </p:extLst>
   </p:cm>
@@ -943,7 +943,7 @@
     <p:text>Minor edits - adding the numpy website link etc</p:text>
     <p:extLst>
       <p:ext uri="{C676402C-5697-4E1C-873F-D02D1690AC5C}">
-        <p15:threadingInfo xmlns:p15="http://schemas.microsoft.com/office/powerpoint/2012/main" timeZoneBias="420"/>
+        <p15:threadingInfo xmlns:p15="http://schemas.microsoft.com/office/powerpoint/2012/main" xmlns="" timeZoneBias="420"/>
       </p:ext>
     </p:extLst>
   </p:cm>
@@ -957,7 +957,7 @@
     <p:text>Slide removal permanently - Will talk about spicy in the Scipy deck</p:text>
     <p:extLst>
       <p:ext uri="{C676402C-5697-4E1C-873F-D02D1690AC5C}">
-        <p15:threadingInfo xmlns:p15="http://schemas.microsoft.com/office/powerpoint/2012/main" timeZoneBias="420"/>
+        <p15:threadingInfo xmlns:p15="http://schemas.microsoft.com/office/powerpoint/2012/main" xmlns="" timeZoneBias="420"/>
       </p:ext>
     </p:extLst>
   </p:cm>
@@ -971,7 +971,7 @@
     <p:text>Slide addition at this location - Need a header slide for Numpy ndArrays - Its not part of the introductions to Numpy</p:text>
     <p:extLst>
       <p:ext uri="{C676402C-5697-4E1C-873F-D02D1690AC5C}">
-        <p15:threadingInfo xmlns:p15="http://schemas.microsoft.com/office/powerpoint/2012/main" timeZoneBias="420"/>
+        <p15:threadingInfo xmlns:p15="http://schemas.microsoft.com/office/powerpoint/2012/main" xmlns="" timeZoneBias="420"/>
       </p:ext>
     </p:extLst>
   </p:cm>
@@ -985,7 +985,7 @@
     <p:text>Code Snippet Consistency - (Input: Pink + Bold with arrows), (Output: Black + Non-Bold)</p:text>
     <p:extLst>
       <p:ext uri="{C676402C-5697-4E1C-873F-D02D1690AC5C}">
-        <p15:threadingInfo xmlns:p15="http://schemas.microsoft.com/office/powerpoint/2012/main" timeZoneBias="420"/>
+        <p15:threadingInfo xmlns:p15="http://schemas.microsoft.com/office/powerpoint/2012/main" xmlns="" timeZoneBias="420"/>
       </p:ext>
     </p:extLst>
   </p:cm>
@@ -999,7 +999,7 @@
     <p:text>Minor edits - Intro to importing numpy added, formatting</p:text>
     <p:extLst>
       <p:ext uri="{C676402C-5697-4E1C-873F-D02D1690AC5C}">
-        <p15:threadingInfo xmlns:p15="http://schemas.microsoft.com/office/powerpoint/2012/main" timeZoneBias="420"/>
+        <p15:threadingInfo xmlns:p15="http://schemas.microsoft.com/office/powerpoint/2012/main" xmlns="" timeZoneBias="420"/>
       </p:ext>
     </p:extLst>
   </p:cm>
@@ -1008,7 +1008,7 @@
     <p:text>Code Snippet Consistency - (Input: Pink + Bold with arrows), (Output: Black + Non-Bold)</p:text>
     <p:extLst>
       <p:ext uri="{C676402C-5697-4E1C-873F-D02D1690AC5C}">
-        <p15:threadingInfo xmlns:p15="http://schemas.microsoft.com/office/powerpoint/2012/main" timeZoneBias="420"/>
+        <p15:threadingInfo xmlns:p15="http://schemas.microsoft.com/office/powerpoint/2012/main" xmlns="" timeZoneBias="420"/>
       </p:ext>
     </p:extLst>
   </p:cm>
@@ -1147,7 +1147,7 @@
     </p:spTree>
     <p:extLst>
       <p:ext uri="{BB962C8B-B14F-4D97-AF65-F5344CB8AC3E}">
-        <p14:creationId xmlns:p14="http://schemas.microsoft.com/office/powerpoint/2010/main" val="3239291525"/>
+        <p14:creationId xmlns:p14="http://schemas.microsoft.com/office/powerpoint/2010/main" xmlns="" val="3239291525"/>
       </p:ext>
     </p:extLst>
   </p:cSld>
@@ -1461,7 +1461,7 @@
     </p:spTree>
     <p:extLst>
       <p:ext uri="{BB962C8B-B14F-4D97-AF65-F5344CB8AC3E}">
-        <p14:creationId xmlns:p14="http://schemas.microsoft.com/office/powerpoint/2010/main" val="953744030"/>
+        <p14:creationId xmlns:p14="http://schemas.microsoft.com/office/powerpoint/2010/main" xmlns="" val="953744030"/>
       </p:ext>
     </p:extLst>
   </p:cSld>
@@ -1665,7 +1665,7 @@
     </p:spTree>
     <p:extLst>
       <p:ext uri="{BB962C8B-B14F-4D97-AF65-F5344CB8AC3E}">
-        <p14:creationId xmlns:p14="http://schemas.microsoft.com/office/powerpoint/2010/main" val="1927175504"/>
+        <p14:creationId xmlns:p14="http://schemas.microsoft.com/office/powerpoint/2010/main" xmlns="" val="1927175504"/>
       </p:ext>
     </p:extLst>
   </p:cSld>
@@ -1735,7 +1735,7 @@
     </p:spTree>
     <p:extLst>
       <p:ext uri="{BB962C8B-B14F-4D97-AF65-F5344CB8AC3E}">
-        <p14:creationId xmlns:p14="http://schemas.microsoft.com/office/powerpoint/2010/main" val="1284578565"/>
+        <p14:creationId xmlns:p14="http://schemas.microsoft.com/office/powerpoint/2010/main" xmlns="" val="1284578565"/>
       </p:ext>
     </p:extLst>
   </p:cSld>
@@ -1805,7 +1805,7 @@
     </p:spTree>
     <p:extLst>
       <p:ext uri="{BB962C8B-B14F-4D97-AF65-F5344CB8AC3E}">
-        <p14:creationId xmlns:p14="http://schemas.microsoft.com/office/powerpoint/2010/main" val="988669929"/>
+        <p14:creationId xmlns:p14="http://schemas.microsoft.com/office/powerpoint/2010/main" xmlns="" val="988669929"/>
       </p:ext>
     </p:extLst>
   </p:cSld>
@@ -1895,7 +1895,7 @@
     </p:spTree>
     <p:extLst>
       <p:ext uri="{BB962C8B-B14F-4D97-AF65-F5344CB8AC3E}">
-        <p14:creationId xmlns:p14="http://schemas.microsoft.com/office/powerpoint/2010/main" val="2414749073"/>
+        <p14:creationId xmlns:p14="http://schemas.microsoft.com/office/powerpoint/2010/main" xmlns="" val="2414749073"/>
       </p:ext>
     </p:extLst>
   </p:cSld>
@@ -1965,7 +1965,7 @@
     </p:spTree>
     <p:extLst>
       <p:ext uri="{BB962C8B-B14F-4D97-AF65-F5344CB8AC3E}">
-        <p14:creationId xmlns:p14="http://schemas.microsoft.com/office/powerpoint/2010/main" val="1231062568"/>
+        <p14:creationId xmlns:p14="http://schemas.microsoft.com/office/powerpoint/2010/main" xmlns="" val="1231062568"/>
       </p:ext>
     </p:extLst>
   </p:cSld>
@@ -2035,7 +2035,7 @@
     </p:spTree>
     <p:extLst>
       <p:ext uri="{BB962C8B-B14F-4D97-AF65-F5344CB8AC3E}">
-        <p14:creationId xmlns:p14="http://schemas.microsoft.com/office/powerpoint/2010/main" val="1327072400"/>
+        <p14:creationId xmlns:p14="http://schemas.microsoft.com/office/powerpoint/2010/main" xmlns="" val="1327072400"/>
       </p:ext>
     </p:extLst>
   </p:cSld>
@@ -2109,7 +2109,7 @@
     </p:spTree>
     <p:extLst>
       <p:ext uri="{BB962C8B-B14F-4D97-AF65-F5344CB8AC3E}">
-        <p14:creationId xmlns:p14="http://schemas.microsoft.com/office/powerpoint/2010/main" val="58045805"/>
+        <p14:creationId xmlns:p14="http://schemas.microsoft.com/office/powerpoint/2010/main" xmlns="" val="58045805"/>
       </p:ext>
     </p:extLst>
   </p:cSld>
@@ -2179,7 +2179,7 @@
     </p:spTree>
     <p:extLst>
       <p:ext uri="{BB962C8B-B14F-4D97-AF65-F5344CB8AC3E}">
-        <p14:creationId xmlns:p14="http://schemas.microsoft.com/office/powerpoint/2010/main" val="679204426"/>
+        <p14:creationId xmlns:p14="http://schemas.microsoft.com/office/powerpoint/2010/main" xmlns="" val="679204426"/>
       </p:ext>
     </p:extLst>
   </p:cSld>
@@ -2249,7 +2249,7 @@
     </p:spTree>
     <p:extLst>
       <p:ext uri="{BB962C8B-B14F-4D97-AF65-F5344CB8AC3E}">
-        <p14:creationId xmlns:p14="http://schemas.microsoft.com/office/powerpoint/2010/main" val="1593592273"/>
+        <p14:creationId xmlns:p14="http://schemas.microsoft.com/office/powerpoint/2010/main" xmlns="" val="1593592273"/>
       </p:ext>
     </p:extLst>
   </p:cSld>
@@ -2365,7 +2365,7 @@
     </p:spTree>
     <p:extLst>
       <p:ext uri="{BB962C8B-B14F-4D97-AF65-F5344CB8AC3E}">
-        <p14:creationId xmlns:p14="http://schemas.microsoft.com/office/powerpoint/2010/main" val="1476251103"/>
+        <p14:creationId xmlns:p14="http://schemas.microsoft.com/office/powerpoint/2010/main" xmlns="" val="1476251103"/>
       </p:ext>
     </p:extLst>
   </p:cSld>
@@ -2481,7 +2481,7 @@
     </p:spTree>
     <p:extLst>
       <p:ext uri="{BB962C8B-B14F-4D97-AF65-F5344CB8AC3E}">
-        <p14:creationId xmlns:p14="http://schemas.microsoft.com/office/powerpoint/2010/main" val="1477337758"/>
+        <p14:creationId xmlns:p14="http://schemas.microsoft.com/office/powerpoint/2010/main" xmlns="" val="1477337758"/>
       </p:ext>
     </p:extLst>
   </p:cSld>
@@ -2597,7 +2597,7 @@
     </p:spTree>
     <p:extLst>
       <p:ext uri="{BB962C8B-B14F-4D97-AF65-F5344CB8AC3E}">
-        <p14:creationId xmlns:p14="http://schemas.microsoft.com/office/powerpoint/2010/main" val="685434860"/>
+        <p14:creationId xmlns:p14="http://schemas.microsoft.com/office/powerpoint/2010/main" xmlns="" val="685434860"/>
       </p:ext>
     </p:extLst>
   </p:cSld>
@@ -2713,7 +2713,7 @@
     </p:spTree>
     <p:extLst>
       <p:ext uri="{BB962C8B-B14F-4D97-AF65-F5344CB8AC3E}">
-        <p14:creationId xmlns:p14="http://schemas.microsoft.com/office/powerpoint/2010/main" val="1349651721"/>
+        <p14:creationId xmlns:p14="http://schemas.microsoft.com/office/powerpoint/2010/main" xmlns="" val="1349651721"/>
       </p:ext>
     </p:extLst>
   </p:cSld>
@@ -4292,7 +4292,7 @@
           <p:cNvPr id="6" name="Rectangle 3">
             <a:extLst>
               <a:ext uri="{FF2B5EF4-FFF2-40B4-BE49-F238E27FC236}">
-                <a16:creationId xmlns="" xmlns:a16="http://schemas.microsoft.com/office/drawing/2014/main" id="{AA4B9897-13C0-3049-8823-B24C807F663F}"/>
+                <a16:creationId xmlns:a16="http://schemas.microsoft.com/office/drawing/2014/main" xmlns="" id="{AA4B9897-13C0-3049-8823-B24C807F663F}"/>
               </a:ext>
             </a:extLst>
           </p:cNvPr>
@@ -4576,7 +4576,7 @@
     </p:spTree>
     <p:extLst>
       <p:ext uri="{BB962C8B-B14F-4D97-AF65-F5344CB8AC3E}">
-        <p14:creationId xmlns:p14="http://schemas.microsoft.com/office/powerpoint/2010/main" val="1116979933"/>
+        <p14:creationId xmlns:p14="http://schemas.microsoft.com/office/powerpoint/2010/main" xmlns="" val="1116979933"/>
       </p:ext>
     </p:extLst>
   </p:cSld>
@@ -4584,7 +4584,7 @@
     <a:masterClrMapping/>
   </p:clrMapOvr>
   <mc:AlternateContent xmlns:mc="http://schemas.openxmlformats.org/markup-compatibility/2006">
-    <mc:Choice xmlns:p14="http://schemas.microsoft.com/office/powerpoint/2010/main" Requires="p14">
+    <mc:Choice xmlns:p14="http://schemas.microsoft.com/office/powerpoint/2010/main" xmlns="" Requires="p14">
       <p:transition spd="slow" p14:dur="2000"/>
     </mc:Choice>
     <mc:Fallback>
@@ -4914,7 +4914,7 @@
     </p:spTree>
     <p:extLst>
       <p:ext uri="{BB962C8B-B14F-4D97-AF65-F5344CB8AC3E}">
-        <p14:creationId xmlns:p14="http://schemas.microsoft.com/office/powerpoint/2010/main" val="4039705547"/>
+        <p14:creationId xmlns:p14="http://schemas.microsoft.com/office/powerpoint/2010/main" xmlns="" val="4039705547"/>
       </p:ext>
     </p:extLst>
   </p:cSld>
@@ -4922,7 +4922,7 @@
     <a:masterClrMapping/>
   </p:clrMapOvr>
   <mc:AlternateContent xmlns:mc="http://schemas.openxmlformats.org/markup-compatibility/2006">
-    <mc:Choice xmlns:p14="http://schemas.microsoft.com/office/powerpoint/2010/main" Requires="p14">
+    <mc:Choice xmlns:p14="http://schemas.microsoft.com/office/powerpoint/2010/main" xmlns="" Requires="p14">
       <p:transition spd="slow" p14:dur="2000"/>
     </mc:Choice>
     <mc:Fallback>
@@ -5553,7 +5553,7 @@
     </p:spTree>
     <p:extLst>
       <p:ext uri="{BB962C8B-B14F-4D97-AF65-F5344CB8AC3E}">
-        <p14:creationId xmlns:p14="http://schemas.microsoft.com/office/powerpoint/2010/main" val="930354321"/>
+        <p14:creationId xmlns:p14="http://schemas.microsoft.com/office/powerpoint/2010/main" xmlns="" val="930354321"/>
       </p:ext>
     </p:extLst>
   </p:cSld>
@@ -5883,7 +5883,7 @@
     </p:spTree>
     <p:extLst>
       <p:ext uri="{BB962C8B-B14F-4D97-AF65-F5344CB8AC3E}">
-        <p14:creationId xmlns:p14="http://schemas.microsoft.com/office/powerpoint/2010/main" val="396239007"/>
+        <p14:creationId xmlns:p14="http://schemas.microsoft.com/office/powerpoint/2010/main" xmlns="" val="396239007"/>
       </p:ext>
     </p:extLst>
   </p:cSld>
@@ -5891,7 +5891,7 @@
     <a:masterClrMapping/>
   </p:clrMapOvr>
   <mc:AlternateContent xmlns:mc="http://schemas.openxmlformats.org/markup-compatibility/2006">
-    <mc:Choice xmlns:p14="http://schemas.microsoft.com/office/powerpoint/2010/main" Requires="p14">
+    <mc:Choice xmlns:p14="http://schemas.microsoft.com/office/powerpoint/2010/main" xmlns="" Requires="p14">
       <p:transition spd="slow" p14:dur="2000"/>
     </mc:Choice>
     <mc:Fallback>
@@ -6321,7 +6321,7 @@
     </p:spTree>
     <p:extLst>
       <p:ext uri="{BB962C8B-B14F-4D97-AF65-F5344CB8AC3E}">
-        <p14:creationId xmlns:p14="http://schemas.microsoft.com/office/powerpoint/2010/main" val="1019510061"/>
+        <p14:creationId xmlns:p14="http://schemas.microsoft.com/office/powerpoint/2010/main" xmlns="" val="1019510061"/>
       </p:ext>
     </p:extLst>
   </p:cSld>
@@ -6818,7 +6818,7 @@
     </p:spTree>
     <p:extLst>
       <p:ext uri="{BB962C8B-B14F-4D97-AF65-F5344CB8AC3E}">
-        <p14:creationId xmlns:p14="http://schemas.microsoft.com/office/powerpoint/2010/main" val="135911274"/>
+        <p14:creationId xmlns:p14="http://schemas.microsoft.com/office/powerpoint/2010/main" xmlns="" val="135911274"/>
       </p:ext>
     </p:extLst>
   </p:cSld>
@@ -6826,7 +6826,7 @@
     <a:masterClrMapping/>
   </p:clrMapOvr>
   <mc:AlternateContent xmlns:mc="http://schemas.openxmlformats.org/markup-compatibility/2006">
-    <mc:Choice xmlns:p14="http://schemas.microsoft.com/office/powerpoint/2010/main" Requires="p14">
+    <mc:Choice xmlns:p14="http://schemas.microsoft.com/office/powerpoint/2010/main" xmlns="" Requires="p14">
       <p:transition spd="slow" p14:dur="2000"/>
     </mc:Choice>
     <mc:Fallback>
@@ -6939,15 +6939,7 @@
           <a:p>
             <a:r>
               <a:rPr lang="en-US" dirty="0" smtClean="0"/>
-              <a:t>Types </a:t>
-            </a:r>
-            <a:r>
-              <a:rPr lang="en-US" dirty="0"/>
-              <a:t>can also be </a:t>
-            </a:r>
-            <a:r>
-              <a:rPr lang="en-US" dirty="0" smtClean="0"/>
-              <a:t>specified explicitly. For Example: </a:t>
+              <a:t>Types can also be specified explicitly. For Example: </a:t>
             </a:r>
             <a:r>
               <a:rPr lang="en-US" dirty="0" err="1" smtClean="0"/>
@@ -7308,7 +7300,7 @@
     </p:spTree>
     <p:extLst>
       <p:ext uri="{BB962C8B-B14F-4D97-AF65-F5344CB8AC3E}">
-        <p14:creationId xmlns:p14="http://schemas.microsoft.com/office/powerpoint/2010/main" val="1519086867"/>
+        <p14:creationId xmlns:p14="http://schemas.microsoft.com/office/powerpoint/2010/main" xmlns="" val="1519086867"/>
       </p:ext>
     </p:extLst>
   </p:cSld>
@@ -7681,7 +7673,7 @@
     </p:spTree>
     <p:extLst>
       <p:ext uri="{BB962C8B-B14F-4D97-AF65-F5344CB8AC3E}">
-        <p14:creationId xmlns:p14="http://schemas.microsoft.com/office/powerpoint/2010/main" val="3032597143"/>
+        <p14:creationId xmlns:p14="http://schemas.microsoft.com/office/powerpoint/2010/main" xmlns="" val="3032597143"/>
       </p:ext>
     </p:extLst>
   </p:cSld>
@@ -7689,7 +7681,7 @@
     <a:masterClrMapping/>
   </p:clrMapOvr>
   <mc:AlternateContent xmlns:mc="http://schemas.openxmlformats.org/markup-compatibility/2006">
-    <mc:Choice xmlns:p14="http://schemas.microsoft.com/office/powerpoint/2010/main" Requires="p14">
+    <mc:Choice xmlns:p14="http://schemas.microsoft.com/office/powerpoint/2010/main" xmlns="" Requires="p14">
       <p:transition spd="slow" p14:dur="2000"/>
     </mc:Choice>
     <mc:Fallback>
@@ -8182,7 +8174,7 @@
     </p:spTree>
     <p:extLst>
       <p:ext uri="{BB962C8B-B14F-4D97-AF65-F5344CB8AC3E}">
-        <p14:creationId xmlns:p14="http://schemas.microsoft.com/office/powerpoint/2010/main" val="1249360004"/>
+        <p14:creationId xmlns:p14="http://schemas.microsoft.com/office/powerpoint/2010/main" xmlns="" val="1249360004"/>
       </p:ext>
     </p:extLst>
   </p:cSld>
@@ -9043,7 +9035,7 @@
     </p:spTree>
     <p:extLst>
       <p:ext uri="{BB962C8B-B14F-4D97-AF65-F5344CB8AC3E}">
-        <p14:creationId xmlns:p14="http://schemas.microsoft.com/office/powerpoint/2010/main" val="267772624"/>
+        <p14:creationId xmlns:p14="http://schemas.microsoft.com/office/powerpoint/2010/main" xmlns="" val="267772624"/>
       </p:ext>
     </p:extLst>
   </p:cSld>
@@ -9423,7 +9415,7 @@
     </p:spTree>
     <p:extLst>
       <p:ext uri="{BB962C8B-B14F-4D97-AF65-F5344CB8AC3E}">
-        <p14:creationId xmlns:p14="http://schemas.microsoft.com/office/powerpoint/2010/main" val="2125812599"/>
+        <p14:creationId xmlns:p14="http://schemas.microsoft.com/office/powerpoint/2010/main" xmlns="" val="2125812599"/>
       </p:ext>
     </p:extLst>
   </p:cSld>
@@ -9431,7 +9423,7 @@
     <a:masterClrMapping/>
   </p:clrMapOvr>
   <mc:AlternateContent xmlns:mc="http://schemas.openxmlformats.org/markup-compatibility/2006">
-    <mc:Choice xmlns:p14="http://schemas.microsoft.com/office/powerpoint/2010/main" Requires="p14">
+    <mc:Choice xmlns:p14="http://schemas.microsoft.com/office/powerpoint/2010/main" xmlns="" Requires="p14">
       <p:transition spd="slow" p14:dur="2000"/>
     </mc:Choice>
     <mc:Fallback>
@@ -9499,7 +9491,7 @@
           <p:cNvPr id="6" name="Rectangle 3">
             <a:extLst>
               <a:ext uri="{FF2B5EF4-FFF2-40B4-BE49-F238E27FC236}">
-                <a16:creationId xmlns="" xmlns:a16="http://schemas.microsoft.com/office/drawing/2014/main" id="{AA4B9897-13C0-3049-8823-B24C807F663F}"/>
+                <a16:creationId xmlns:a16="http://schemas.microsoft.com/office/drawing/2014/main" xmlns="" id="{AA4B9897-13C0-3049-8823-B24C807F663F}"/>
               </a:ext>
             </a:extLst>
           </p:cNvPr>
@@ -9795,7 +9787,7 @@
     </p:spTree>
     <p:extLst>
       <p:ext uri="{BB962C8B-B14F-4D97-AF65-F5344CB8AC3E}">
-        <p14:creationId xmlns:p14="http://schemas.microsoft.com/office/powerpoint/2010/main" val="503249698"/>
+        <p14:creationId xmlns:p14="http://schemas.microsoft.com/office/powerpoint/2010/main" xmlns="" val="503249698"/>
       </p:ext>
     </p:extLst>
   </p:cSld>
@@ -10247,7 +10239,7 @@
     </p:spTree>
     <p:extLst>
       <p:ext uri="{BB962C8B-B14F-4D97-AF65-F5344CB8AC3E}">
-        <p14:creationId xmlns:p14="http://schemas.microsoft.com/office/powerpoint/2010/main" val="874394060"/>
+        <p14:creationId xmlns:p14="http://schemas.microsoft.com/office/powerpoint/2010/main" xmlns="" val="874394060"/>
       </p:ext>
     </p:extLst>
   </p:cSld>
@@ -10888,7 +10880,7 @@
     </p:spTree>
     <p:extLst>
       <p:ext uri="{BB962C8B-B14F-4D97-AF65-F5344CB8AC3E}">
-        <p14:creationId xmlns:p14="http://schemas.microsoft.com/office/powerpoint/2010/main" val="3254842197"/>
+        <p14:creationId xmlns:p14="http://schemas.microsoft.com/office/powerpoint/2010/main" xmlns="" val="3254842197"/>
       </p:ext>
     </p:extLst>
   </p:cSld>
@@ -10896,7 +10888,7 @@
     <a:masterClrMapping/>
   </p:clrMapOvr>
   <mc:AlternateContent xmlns:mc="http://schemas.openxmlformats.org/markup-compatibility/2006">
-    <mc:Choice xmlns:p14="http://schemas.microsoft.com/office/powerpoint/2010/main" Requires="p14">
+    <mc:Choice xmlns:p14="http://schemas.microsoft.com/office/powerpoint/2010/main" xmlns="" Requires="p14">
       <p:transition spd="slow" p14:dur="2000"/>
     </mc:Choice>
     <mc:Fallback>
@@ -11207,7 +11199,7 @@
     </p:spTree>
     <p:extLst>
       <p:ext uri="{BB962C8B-B14F-4D97-AF65-F5344CB8AC3E}">
-        <p14:creationId xmlns:p14="http://schemas.microsoft.com/office/powerpoint/2010/main" val="3037996022"/>
+        <p14:creationId xmlns:p14="http://schemas.microsoft.com/office/powerpoint/2010/main" xmlns="" val="3037996022"/>
       </p:ext>
     </p:extLst>
   </p:cSld>
@@ -11215,7 +11207,7 @@
     <a:masterClrMapping/>
   </p:clrMapOvr>
   <mc:AlternateContent xmlns:mc="http://schemas.openxmlformats.org/markup-compatibility/2006">
-    <mc:Choice xmlns:p14="http://schemas.microsoft.com/office/powerpoint/2010/main" Requires="p14">
+    <mc:Choice xmlns:p14="http://schemas.microsoft.com/office/powerpoint/2010/main" xmlns="" Requires="p14">
       <p:transition spd="slow" p14:dur="2000"/>
     </mc:Choice>
     <mc:Fallback>
@@ -11932,7 +11924,7 @@
     </p:spTree>
     <p:extLst>
       <p:ext uri="{BB962C8B-B14F-4D97-AF65-F5344CB8AC3E}">
-        <p14:creationId xmlns:p14="http://schemas.microsoft.com/office/powerpoint/2010/main" val="1757586787"/>
+        <p14:creationId xmlns:p14="http://schemas.microsoft.com/office/powerpoint/2010/main" xmlns="" val="1757586787"/>
       </p:ext>
     </p:extLst>
   </p:cSld>
@@ -12224,7 +12216,7 @@
     </p:spTree>
     <p:extLst>
       <p:ext uri="{BB962C8B-B14F-4D97-AF65-F5344CB8AC3E}">
-        <p14:creationId xmlns:p14="http://schemas.microsoft.com/office/powerpoint/2010/main" val="3542390094"/>
+        <p14:creationId xmlns:p14="http://schemas.microsoft.com/office/powerpoint/2010/main" xmlns="" val="3542390094"/>
       </p:ext>
     </p:extLst>
   </p:cSld>
@@ -12232,7 +12224,7 @@
     <a:masterClrMapping/>
   </p:clrMapOvr>
   <mc:AlternateContent xmlns:mc="http://schemas.openxmlformats.org/markup-compatibility/2006">
-    <mc:Choice xmlns:p14="http://schemas.microsoft.com/office/powerpoint/2010/main" Requires="p14">
+    <mc:Choice xmlns:p14="http://schemas.microsoft.com/office/powerpoint/2010/main" xmlns="" Requires="p14">
       <p:transition spd="slow" p14:dur="2000"/>
     </mc:Choice>
     <mc:Fallback>
@@ -13034,7 +13026,7 @@
     </p:spTree>
     <p:extLst>
       <p:ext uri="{BB962C8B-B14F-4D97-AF65-F5344CB8AC3E}">
-        <p14:creationId xmlns:p14="http://schemas.microsoft.com/office/powerpoint/2010/main" val="376913392"/>
+        <p14:creationId xmlns:p14="http://schemas.microsoft.com/office/powerpoint/2010/main" xmlns="" val="376913392"/>
       </p:ext>
     </p:extLst>
   </p:cSld>
@@ -13671,7 +13663,7 @@
     </p:spTree>
     <p:extLst>
       <p:ext uri="{BB962C8B-B14F-4D97-AF65-F5344CB8AC3E}">
-        <p14:creationId xmlns:p14="http://schemas.microsoft.com/office/powerpoint/2010/main" val="60446826"/>
+        <p14:creationId xmlns:p14="http://schemas.microsoft.com/office/powerpoint/2010/main" xmlns="" val="60446826"/>
       </p:ext>
     </p:extLst>
   </p:cSld>
@@ -13679,7 +13671,7 @@
     <a:masterClrMapping/>
   </p:clrMapOvr>
   <mc:AlternateContent xmlns:mc="http://schemas.openxmlformats.org/markup-compatibility/2006">
-    <mc:Choice xmlns:p14="http://schemas.microsoft.com/office/powerpoint/2010/main" Requires="p14">
+    <mc:Choice xmlns:p14="http://schemas.microsoft.com/office/powerpoint/2010/main" xmlns="" Requires="p14">
       <p:transition spd="slow" p14:dur="2000"/>
     </mc:Choice>
     <mc:Fallback>
@@ -13958,7 +13950,7 @@
     </p:spTree>
     <p:extLst>
       <p:ext uri="{BB962C8B-B14F-4D97-AF65-F5344CB8AC3E}">
-        <p14:creationId xmlns:p14="http://schemas.microsoft.com/office/powerpoint/2010/main" val="1854104341"/>
+        <p14:creationId xmlns:p14="http://schemas.microsoft.com/office/powerpoint/2010/main" xmlns="" val="1854104341"/>
       </p:ext>
     </p:extLst>
   </p:cSld>
@@ -14492,7 +14484,7 @@
     </p:spTree>
     <p:extLst>
       <p:ext uri="{BB962C8B-B14F-4D97-AF65-F5344CB8AC3E}">
-        <p14:creationId xmlns:p14="http://schemas.microsoft.com/office/powerpoint/2010/main" val="1943941217"/>
+        <p14:creationId xmlns:p14="http://schemas.microsoft.com/office/powerpoint/2010/main" xmlns="" val="1943941217"/>
       </p:ext>
     </p:extLst>
   </p:cSld>
@@ -14907,7 +14899,7 @@
     </p:spTree>
     <p:extLst>
       <p:ext uri="{BB962C8B-B14F-4D97-AF65-F5344CB8AC3E}">
-        <p14:creationId xmlns:p14="http://schemas.microsoft.com/office/powerpoint/2010/main" val="1227197827"/>
+        <p14:creationId xmlns:p14="http://schemas.microsoft.com/office/powerpoint/2010/main" xmlns="" val="1227197827"/>
       </p:ext>
     </p:extLst>
   </p:cSld>
@@ -14915,7 +14907,7 @@
     <a:masterClrMapping/>
   </p:clrMapOvr>
   <mc:AlternateContent xmlns:mc="http://schemas.openxmlformats.org/markup-compatibility/2006">
-    <mc:Choice xmlns:p14="http://schemas.microsoft.com/office/powerpoint/2010/main" Requires="p14">
+    <mc:Choice xmlns:p14="http://schemas.microsoft.com/office/powerpoint/2010/main" xmlns="" Requires="p14">
       <p:transition spd="slow" p14:dur="2000"/>
     </mc:Choice>
     <mc:Fallback>
@@ -15200,7 +15192,7 @@
     </p:spTree>
     <p:extLst>
       <p:ext uri="{BB962C8B-B14F-4D97-AF65-F5344CB8AC3E}">
-        <p14:creationId xmlns:p14="http://schemas.microsoft.com/office/powerpoint/2010/main" val="1921328592"/>
+        <p14:creationId xmlns:p14="http://schemas.microsoft.com/office/powerpoint/2010/main" xmlns="" val="1921328592"/>
       </p:ext>
     </p:extLst>
   </p:cSld>
@@ -15668,7 +15660,7 @@
     </p:spTree>
     <p:extLst>
       <p:ext uri="{BB962C8B-B14F-4D97-AF65-F5344CB8AC3E}">
-        <p14:creationId xmlns:p14="http://schemas.microsoft.com/office/powerpoint/2010/main" val="3828661"/>
+        <p14:creationId xmlns:p14="http://schemas.microsoft.com/office/powerpoint/2010/main" xmlns="" val="3828661"/>
       </p:ext>
     </p:extLst>
   </p:cSld>
@@ -16215,7 +16207,7 @@
     </p:spTree>
     <p:extLst>
       <p:ext uri="{BB962C8B-B14F-4D97-AF65-F5344CB8AC3E}">
-        <p14:creationId xmlns:p14="http://schemas.microsoft.com/office/powerpoint/2010/main" val="3658009828"/>
+        <p14:creationId xmlns:p14="http://schemas.microsoft.com/office/powerpoint/2010/main" xmlns="" val="3658009828"/>
       </p:ext>
     </p:extLst>
   </p:cSld>
@@ -16223,7 +16215,7 @@
     <a:masterClrMapping/>
   </p:clrMapOvr>
   <mc:AlternateContent xmlns:mc="http://schemas.openxmlformats.org/markup-compatibility/2006">
-    <mc:Choice xmlns:p14="http://schemas.microsoft.com/office/powerpoint/2010/main" Requires="p14">
+    <mc:Choice xmlns:p14="http://schemas.microsoft.com/office/powerpoint/2010/main" xmlns="" Requires="p14">
       <p:transition spd="slow" p14:dur="2000"/>
     </mc:Choice>
     <mc:Fallback>
@@ -16958,7 +16950,7 @@
     </p:spTree>
     <p:extLst>
       <p:ext uri="{BB962C8B-B14F-4D97-AF65-F5344CB8AC3E}">
-        <p14:creationId xmlns:p14="http://schemas.microsoft.com/office/powerpoint/2010/main" val="1287394978"/>
+        <p14:creationId xmlns:p14="http://schemas.microsoft.com/office/powerpoint/2010/main" xmlns="" val="1287394978"/>
       </p:ext>
     </p:extLst>
   </p:cSld>
@@ -17026,7 +17018,7 @@
           <p:cNvPr id="6" name="Rectangle 3">
             <a:extLst>
               <a:ext uri="{FF2B5EF4-FFF2-40B4-BE49-F238E27FC236}">
-                <a16:creationId xmlns="" xmlns:a16="http://schemas.microsoft.com/office/drawing/2014/main" id="{AA4B9897-13C0-3049-8823-B24C807F663F}"/>
+                <a16:creationId xmlns:a16="http://schemas.microsoft.com/office/drawing/2014/main" xmlns="" id="{AA4B9897-13C0-3049-8823-B24C807F663F}"/>
               </a:ext>
             </a:extLst>
           </p:cNvPr>
@@ -17336,7 +17328,7 @@
     </p:spTree>
     <p:extLst>
       <p:ext uri="{BB962C8B-B14F-4D97-AF65-F5344CB8AC3E}">
-        <p14:creationId xmlns:p14="http://schemas.microsoft.com/office/powerpoint/2010/main" val="678424184"/>
+        <p14:creationId xmlns:p14="http://schemas.microsoft.com/office/powerpoint/2010/main" xmlns="" val="678424184"/>
       </p:ext>
     </p:extLst>
   </p:cSld>
@@ -17584,7 +17576,7 @@
     </p:spTree>
     <p:extLst>
       <p:ext uri="{BB962C8B-B14F-4D97-AF65-F5344CB8AC3E}">
-        <p14:creationId xmlns:p14="http://schemas.microsoft.com/office/powerpoint/2010/main" val="70227106"/>
+        <p14:creationId xmlns:p14="http://schemas.microsoft.com/office/powerpoint/2010/main" xmlns="" val="70227106"/>
       </p:ext>
     </p:extLst>
   </p:cSld>
@@ -17592,7 +17584,7 @@
     <a:masterClrMapping/>
   </p:clrMapOvr>
   <mc:AlternateContent xmlns:mc="http://schemas.openxmlformats.org/markup-compatibility/2006">
-    <mc:Choice xmlns:p14="http://schemas.microsoft.com/office/powerpoint/2010/main" Requires="p14">
+    <mc:Choice xmlns:p14="http://schemas.microsoft.com/office/powerpoint/2010/main" xmlns="" Requires="p14">
       <p:transition spd="slow" p14:dur="2000"/>
     </mc:Choice>
     <mc:Fallback>
@@ -18456,7 +18448,7 @@
     </p:spTree>
     <p:extLst>
       <p:ext uri="{BB962C8B-B14F-4D97-AF65-F5344CB8AC3E}">
-        <p14:creationId xmlns:p14="http://schemas.microsoft.com/office/powerpoint/2010/main" val="1969000296"/>
+        <p14:creationId xmlns:p14="http://schemas.microsoft.com/office/powerpoint/2010/main" xmlns="" val="1969000296"/>
       </p:ext>
     </p:extLst>
   </p:cSld>
@@ -18464,7 +18456,7 @@
     <a:masterClrMapping/>
   </p:clrMapOvr>
   <mc:AlternateContent xmlns:mc="http://schemas.openxmlformats.org/markup-compatibility/2006">
-    <mc:Choice xmlns:p14="http://schemas.microsoft.com/office/powerpoint/2010/main" Requires="p14">
+    <mc:Choice xmlns:p14="http://schemas.microsoft.com/office/powerpoint/2010/main" xmlns="" Requires="p14">
       <p:transition spd="slow" p14:dur="2000"/>
     </mc:Choice>
     <mc:Fallback>
@@ -18891,7 +18883,7 @@
     </p:spTree>
     <p:extLst>
       <p:ext uri="{BB962C8B-B14F-4D97-AF65-F5344CB8AC3E}">
-        <p14:creationId xmlns:p14="http://schemas.microsoft.com/office/powerpoint/2010/main" val="504277717"/>
+        <p14:creationId xmlns:p14="http://schemas.microsoft.com/office/powerpoint/2010/main" xmlns="" val="504277717"/>
       </p:ext>
     </p:extLst>
   </p:cSld>
@@ -18899,7 +18891,7 @@
     <a:masterClrMapping/>
   </p:clrMapOvr>
   <mc:AlternateContent xmlns:mc="http://schemas.openxmlformats.org/markup-compatibility/2006">
-    <mc:Choice xmlns:p14="http://schemas.microsoft.com/office/powerpoint/2010/main" Requires="p14">
+    <mc:Choice xmlns:p14="http://schemas.microsoft.com/office/powerpoint/2010/main" xmlns="" Requires="p14">
       <p:transition spd="slow" p14:dur="2000"/>
     </mc:Choice>
     <mc:Fallback>
@@ -19816,7 +19808,7 @@
     </p:spTree>
     <p:extLst>
       <p:ext uri="{BB962C8B-B14F-4D97-AF65-F5344CB8AC3E}">
-        <p14:creationId xmlns:p14="http://schemas.microsoft.com/office/powerpoint/2010/main" val="624195052"/>
+        <p14:creationId xmlns:p14="http://schemas.microsoft.com/office/powerpoint/2010/main" xmlns="" val="624195052"/>
       </p:ext>
     </p:extLst>
   </p:cSld>
@@ -21051,7 +21043,7 @@
     </p:spTree>
     <p:extLst>
       <p:ext uri="{BB962C8B-B14F-4D97-AF65-F5344CB8AC3E}">
-        <p14:creationId xmlns:p14="http://schemas.microsoft.com/office/powerpoint/2010/main" val="599083256"/>
+        <p14:creationId xmlns:p14="http://schemas.microsoft.com/office/powerpoint/2010/main" xmlns="" val="599083256"/>
       </p:ext>
     </p:extLst>
   </p:cSld>
@@ -21059,7 +21051,7 @@
     <a:masterClrMapping/>
   </p:clrMapOvr>
   <mc:AlternateContent xmlns:mc="http://schemas.openxmlformats.org/markup-compatibility/2006">
-    <mc:Choice xmlns:p14="http://schemas.microsoft.com/office/powerpoint/2010/main" Requires="p14">
+    <mc:Choice xmlns:p14="http://schemas.microsoft.com/office/powerpoint/2010/main" xmlns="" Requires="p14">
       <p:transition spd="slow" p14:dur="2000"/>
     </mc:Choice>
     <mc:Fallback>
@@ -21701,7 +21693,7 @@
     </p:spTree>
     <p:extLst>
       <p:ext uri="{BB962C8B-B14F-4D97-AF65-F5344CB8AC3E}">
-        <p14:creationId xmlns:p14="http://schemas.microsoft.com/office/powerpoint/2010/main" val="388623369"/>
+        <p14:creationId xmlns:p14="http://schemas.microsoft.com/office/powerpoint/2010/main" xmlns="" val="388623369"/>
       </p:ext>
     </p:extLst>
   </p:cSld>
@@ -21769,7 +21761,7 @@
           <p:cNvPr id="6" name="Rectangle 3">
             <a:extLst>
               <a:ext uri="{FF2B5EF4-FFF2-40B4-BE49-F238E27FC236}">
-                <a16:creationId xmlns="" xmlns:a16="http://schemas.microsoft.com/office/drawing/2014/main" id="{AA4B9897-13C0-3049-8823-B24C807F663F}"/>
+                <a16:creationId xmlns:a16="http://schemas.microsoft.com/office/drawing/2014/main" xmlns="" id="{AA4B9897-13C0-3049-8823-B24C807F663F}"/>
               </a:ext>
             </a:extLst>
           </p:cNvPr>
@@ -22065,7 +22057,7 @@
     </p:spTree>
     <p:extLst>
       <p:ext uri="{BB962C8B-B14F-4D97-AF65-F5344CB8AC3E}">
-        <p14:creationId xmlns:p14="http://schemas.microsoft.com/office/powerpoint/2010/main" val="2106636645"/>
+        <p14:creationId xmlns:p14="http://schemas.microsoft.com/office/powerpoint/2010/main" xmlns="" val="2106636645"/>
       </p:ext>
     </p:extLst>
   </p:cSld>
@@ -22588,7 +22580,7 @@
     </p:spTree>
     <p:extLst>
       <p:ext uri="{BB962C8B-B14F-4D97-AF65-F5344CB8AC3E}">
-        <p14:creationId xmlns:p14="http://schemas.microsoft.com/office/powerpoint/2010/main" val="1469811899"/>
+        <p14:creationId xmlns:p14="http://schemas.microsoft.com/office/powerpoint/2010/main" xmlns="" val="1469811899"/>
       </p:ext>
     </p:extLst>
   </p:cSld>
@@ -22919,7 +22911,7 @@
     </p:spTree>
     <p:extLst>
       <p:ext uri="{BB962C8B-B14F-4D97-AF65-F5344CB8AC3E}">
-        <p14:creationId xmlns:p14="http://schemas.microsoft.com/office/powerpoint/2010/main" val="824464873"/>
+        <p14:creationId xmlns:p14="http://schemas.microsoft.com/office/powerpoint/2010/main" xmlns="" val="824464873"/>
       </p:ext>
     </p:extLst>
   </p:cSld>
@@ -22927,7 +22919,7 @@
     <a:masterClrMapping/>
   </p:clrMapOvr>
   <mc:AlternateContent xmlns:mc="http://schemas.openxmlformats.org/markup-compatibility/2006">
-    <mc:Choice xmlns:p14="http://schemas.microsoft.com/office/powerpoint/2010/main" Requires="p14">
+    <mc:Choice xmlns:p14="http://schemas.microsoft.com/office/powerpoint/2010/main" xmlns="" Requires="p14">
       <p:transition spd="slow" p14:dur="2000"/>
     </mc:Choice>
     <mc:Fallback>
@@ -23613,7 +23605,7 @@
     </p:spTree>
     <p:extLst>
       <p:ext uri="{BB962C8B-B14F-4D97-AF65-F5344CB8AC3E}">
-        <p14:creationId xmlns:p14="http://schemas.microsoft.com/office/powerpoint/2010/main" val="1095192256"/>
+        <p14:creationId xmlns:p14="http://schemas.microsoft.com/office/powerpoint/2010/main" xmlns="" val="1095192256"/>
       </p:ext>
     </p:extLst>
   </p:cSld>
@@ -23681,7 +23673,7 @@
           <p:cNvPr id="6" name="Rectangle 3">
             <a:extLst>
               <a:ext uri="{FF2B5EF4-FFF2-40B4-BE49-F238E27FC236}">
-                <a16:creationId xmlns="" xmlns:a16="http://schemas.microsoft.com/office/drawing/2014/main" id="{AA4B9897-13C0-3049-8823-B24C807F663F}"/>
+                <a16:creationId xmlns:a16="http://schemas.microsoft.com/office/drawing/2014/main" xmlns="" id="{AA4B9897-13C0-3049-8823-B24C807F663F}"/>
               </a:ext>
             </a:extLst>
           </p:cNvPr>
@@ -23997,7 +23989,7 @@
     </p:spTree>
     <p:extLst>
       <p:ext uri="{BB962C8B-B14F-4D97-AF65-F5344CB8AC3E}">
-        <p14:creationId xmlns:p14="http://schemas.microsoft.com/office/powerpoint/2010/main" val="2031013342"/>
+        <p14:creationId xmlns:p14="http://schemas.microsoft.com/office/powerpoint/2010/main" xmlns="" val="2031013342"/>
       </p:ext>
     </p:extLst>
   </p:cSld>
@@ -24347,7 +24339,7 @@
     </p:spTree>
     <p:extLst>
       <p:ext uri="{BB962C8B-B14F-4D97-AF65-F5344CB8AC3E}">
-        <p14:creationId xmlns:p14="http://schemas.microsoft.com/office/powerpoint/2010/main" val="2058068508"/>
+        <p14:creationId xmlns:p14="http://schemas.microsoft.com/office/powerpoint/2010/main" xmlns="" val="2058068508"/>
       </p:ext>
     </p:extLst>
   </p:cSld>
@@ -24355,7 +24347,7 @@
     <a:masterClrMapping/>
   </p:clrMapOvr>
   <mc:AlternateContent xmlns:mc="http://schemas.openxmlformats.org/markup-compatibility/2006">
-    <mc:Choice xmlns:p14="http://schemas.microsoft.com/office/powerpoint/2010/main" Requires="p14">
+    <mc:Choice xmlns:p14="http://schemas.microsoft.com/office/powerpoint/2010/main" xmlns="" Requires="p14">
       <p:transition spd="slow" p14:dur="2000"/>
     </mc:Choice>
     <mc:Fallback>
@@ -24914,7 +24906,7 @@
     </p:spTree>
     <p:extLst>
       <p:ext uri="{BB962C8B-B14F-4D97-AF65-F5344CB8AC3E}">
-        <p14:creationId xmlns:p14="http://schemas.microsoft.com/office/powerpoint/2010/main" val="1456198213"/>
+        <p14:creationId xmlns:p14="http://schemas.microsoft.com/office/powerpoint/2010/main" xmlns="" val="1456198213"/>
       </p:ext>
     </p:extLst>
   </p:cSld>
@@ -25457,7 +25449,7 @@
     </p:spTree>
     <p:extLst>
       <p:ext uri="{BB962C8B-B14F-4D97-AF65-F5344CB8AC3E}">
-        <p14:creationId xmlns:p14="http://schemas.microsoft.com/office/powerpoint/2010/main" val="1263428443"/>
+        <p14:creationId xmlns:p14="http://schemas.microsoft.com/office/powerpoint/2010/main" xmlns="" val="1263428443"/>
       </p:ext>
     </p:extLst>
   </p:cSld>
@@ -25465,7 +25457,7 @@
     <a:masterClrMapping/>
   </p:clrMapOvr>
   <mc:AlternateContent xmlns:mc="http://schemas.openxmlformats.org/markup-compatibility/2006">
-    <mc:Choice xmlns:p14="http://schemas.microsoft.com/office/powerpoint/2010/main" Requires="p14">
+    <mc:Choice xmlns:p14="http://schemas.microsoft.com/office/powerpoint/2010/main" xmlns="" Requires="p14">
       <p:transition spd="slow" p14:dur="2000"/>
     </mc:Choice>
     <mc:Fallback>
@@ -26366,7 +26358,7 @@
     </p:spTree>
     <p:extLst>
       <p:ext uri="{BB962C8B-B14F-4D97-AF65-F5344CB8AC3E}">
-        <p14:creationId xmlns:p14="http://schemas.microsoft.com/office/powerpoint/2010/main" val="700031500"/>
+        <p14:creationId xmlns:p14="http://schemas.microsoft.com/office/powerpoint/2010/main" xmlns="" val="700031500"/>
       </p:ext>
     </p:extLst>
   </p:cSld>
@@ -26952,7 +26944,7 @@
     </p:spTree>
     <p:extLst>
       <p:ext uri="{BB962C8B-B14F-4D97-AF65-F5344CB8AC3E}">
-        <p14:creationId xmlns:p14="http://schemas.microsoft.com/office/powerpoint/2010/main" val="16286309"/>
+        <p14:creationId xmlns:p14="http://schemas.microsoft.com/office/powerpoint/2010/main" xmlns="" val="16286309"/>
       </p:ext>
     </p:extLst>
   </p:cSld>
@@ -27365,7 +27357,7 @@
     </p:spTree>
     <p:extLst>
       <p:ext uri="{BB962C8B-B14F-4D97-AF65-F5344CB8AC3E}">
-        <p14:creationId xmlns:p14="http://schemas.microsoft.com/office/powerpoint/2010/main" val="1382945966"/>
+        <p14:creationId xmlns:p14="http://schemas.microsoft.com/office/powerpoint/2010/main" xmlns="" val="1382945966"/>
       </p:ext>
     </p:extLst>
   </p:cSld>
@@ -27373,7 +27365,7 @@
     <a:masterClrMapping/>
   </p:clrMapOvr>
   <mc:AlternateContent xmlns:mc="http://schemas.openxmlformats.org/markup-compatibility/2006">
-    <mc:Choice xmlns:p14="http://schemas.microsoft.com/office/powerpoint/2010/main" Requires="p14">
+    <mc:Choice xmlns:p14="http://schemas.microsoft.com/office/powerpoint/2010/main" xmlns="" Requires="p14">
       <p:transition spd="slow" p14:dur="2000"/>
     </mc:Choice>
     <mc:Fallback>
@@ -27578,7 +27570,7 @@
     </p:spTree>
     <p:extLst>
       <p:ext uri="{BB962C8B-B14F-4D97-AF65-F5344CB8AC3E}">
-        <p14:creationId xmlns:p14="http://schemas.microsoft.com/office/powerpoint/2010/main" val="2891457419"/>
+        <p14:creationId xmlns:p14="http://schemas.microsoft.com/office/powerpoint/2010/main" xmlns="" val="2891457419"/>
       </p:ext>
     </p:extLst>
   </p:cSld>
@@ -27586,7 +27578,7 @@
     <a:masterClrMapping/>
   </p:clrMapOvr>
   <mc:AlternateContent xmlns:mc="http://schemas.openxmlformats.org/markup-compatibility/2006">
-    <mc:Choice xmlns:p14="http://schemas.microsoft.com/office/powerpoint/2010/main" Requires="p14">
+    <mc:Choice xmlns:p14="http://schemas.microsoft.com/office/powerpoint/2010/main" xmlns="" Requires="p14">
       <p:transition spd="slow" p14:dur="2000"/>
     </mc:Choice>
     <mc:Fallback>
@@ -28017,7 +28009,7 @@
     </p:spTree>
     <p:extLst>
       <p:ext uri="{BB962C8B-B14F-4D97-AF65-F5344CB8AC3E}">
-        <p14:creationId xmlns:p14="http://schemas.microsoft.com/office/powerpoint/2010/main" val="746226599"/>
+        <p14:creationId xmlns:p14="http://schemas.microsoft.com/office/powerpoint/2010/main" xmlns="" val="746226599"/>
       </p:ext>
     </p:extLst>
   </p:cSld>
@@ -28049,7 +28041,7 @@
           <p:cNvPr id="2" name="Title 1">
             <a:extLst>
               <a:ext uri="{FF2B5EF4-FFF2-40B4-BE49-F238E27FC236}">
-                <a16:creationId xmlns="" xmlns:a16="http://schemas.microsoft.com/office/drawing/2014/main" id="{D7E88738-148F-F142-8619-940A057A49AF}"/>
+                <a16:creationId xmlns:a16="http://schemas.microsoft.com/office/drawing/2014/main" xmlns="" id="{D7E88738-148F-F142-8619-940A057A49AF}"/>
               </a:ext>
             </a:extLst>
           </p:cNvPr>
@@ -28077,7 +28069,7 @@
           <p:cNvPr id="3" name="Content Placeholder 2">
             <a:extLst>
               <a:ext uri="{FF2B5EF4-FFF2-40B4-BE49-F238E27FC236}">
-                <a16:creationId xmlns="" xmlns:a16="http://schemas.microsoft.com/office/drawing/2014/main" id="{7190F898-0655-3E49-A389-835187DEF3CA}"/>
+                <a16:creationId xmlns:a16="http://schemas.microsoft.com/office/drawing/2014/main" xmlns="" id="{7190F898-0655-3E49-A389-835187DEF3CA}"/>
               </a:ext>
             </a:extLst>
           </p:cNvPr>
@@ -28197,7 +28189,7 @@
           <p:cNvPr id="4" name="Footer Placeholder 3">
             <a:extLst>
               <a:ext uri="{FF2B5EF4-FFF2-40B4-BE49-F238E27FC236}">
-                <a16:creationId xmlns="" xmlns:a16="http://schemas.microsoft.com/office/drawing/2014/main" id="{007BDF95-2508-014E-982B-14B17D189CC4}"/>
+                <a16:creationId xmlns:a16="http://schemas.microsoft.com/office/drawing/2014/main" xmlns="" id="{007BDF95-2508-014E-982B-14B17D189CC4}"/>
               </a:ext>
             </a:extLst>
           </p:cNvPr>
@@ -28229,7 +28221,7 @@
           <p:cNvPr id="5" name="Slide Number Placeholder 4">
             <a:extLst>
               <a:ext uri="{FF2B5EF4-FFF2-40B4-BE49-F238E27FC236}">
-                <a16:creationId xmlns="" xmlns:a16="http://schemas.microsoft.com/office/drawing/2014/main" id="{E1F849AB-D74F-6D41-91F9-CF79359FE3A0}"/>
+                <a16:creationId xmlns:a16="http://schemas.microsoft.com/office/drawing/2014/main" xmlns="" id="{E1F849AB-D74F-6D41-91F9-CF79359FE3A0}"/>
               </a:ext>
             </a:extLst>
           </p:cNvPr>
@@ -28264,7 +28256,7 @@
           <p:cNvPr id="6" name="Text Box 4">
             <a:extLst>
               <a:ext uri="{FF2B5EF4-FFF2-40B4-BE49-F238E27FC236}">
-                <a16:creationId xmlns="" xmlns:a16="http://schemas.microsoft.com/office/drawing/2014/main" id="{77EB5487-8684-6443-8589-DE1DA4930476}"/>
+                <a16:creationId xmlns:a16="http://schemas.microsoft.com/office/drawing/2014/main" xmlns="" id="{77EB5487-8684-6443-8589-DE1DA4930476}"/>
               </a:ext>
             </a:extLst>
           </p:cNvPr>
@@ -28435,7 +28427,7 @@
     </p:spTree>
     <p:extLst>
       <p:ext uri="{BB962C8B-B14F-4D97-AF65-F5344CB8AC3E}">
-        <p14:creationId xmlns:p14="http://schemas.microsoft.com/office/powerpoint/2010/main" val="1845436206"/>
+        <p14:creationId xmlns:p14="http://schemas.microsoft.com/office/powerpoint/2010/main" xmlns="" val="1845436206"/>
       </p:ext>
     </p:extLst>
   </p:cSld>
@@ -28443,7 +28435,7 @@
     <a:masterClrMapping/>
   </p:clrMapOvr>
   <mc:AlternateContent xmlns:mc="http://schemas.openxmlformats.org/markup-compatibility/2006">
-    <mc:Choice xmlns:p14="http://schemas.microsoft.com/office/powerpoint/2010/main" Requires="p14">
+    <mc:Choice xmlns:p14="http://schemas.microsoft.com/office/powerpoint/2010/main" xmlns="" Requires="p14">
       <p:transition spd="slow" p14:dur="2000"/>
     </mc:Choice>
     <mc:Fallback>
@@ -28475,7 +28467,7 @@
           <p:cNvPr id="2" name="Title 1">
             <a:extLst>
               <a:ext uri="{FF2B5EF4-FFF2-40B4-BE49-F238E27FC236}">
-                <a16:creationId xmlns="" xmlns:a16="http://schemas.microsoft.com/office/drawing/2014/main" id="{BF17EA58-D1F9-E847-BBE1-70DA982F2590}"/>
+                <a16:creationId xmlns:a16="http://schemas.microsoft.com/office/drawing/2014/main" xmlns="" id="{BF17EA58-D1F9-E847-BBE1-70DA982F2590}"/>
               </a:ext>
             </a:extLst>
           </p:cNvPr>
@@ -28503,7 +28495,7 @@
           <p:cNvPr id="3" name="Content Placeholder 2">
             <a:extLst>
               <a:ext uri="{FF2B5EF4-FFF2-40B4-BE49-F238E27FC236}">
-                <a16:creationId xmlns="" xmlns:a16="http://schemas.microsoft.com/office/drawing/2014/main" id="{23F3BFC1-31A7-074B-B45D-F99475C355E6}"/>
+                <a16:creationId xmlns:a16="http://schemas.microsoft.com/office/drawing/2014/main" xmlns="" id="{23F3BFC1-31A7-074B-B45D-F99475C355E6}"/>
               </a:ext>
             </a:extLst>
           </p:cNvPr>
@@ -28558,7 +28550,7 @@
           <p:cNvPr id="4" name="Footer Placeholder 3">
             <a:extLst>
               <a:ext uri="{FF2B5EF4-FFF2-40B4-BE49-F238E27FC236}">
-                <a16:creationId xmlns="" xmlns:a16="http://schemas.microsoft.com/office/drawing/2014/main" id="{06DDAF90-B377-074E-93C9-5D8304B0FD46}"/>
+                <a16:creationId xmlns:a16="http://schemas.microsoft.com/office/drawing/2014/main" xmlns="" id="{06DDAF90-B377-074E-93C9-5D8304B0FD46}"/>
               </a:ext>
             </a:extLst>
           </p:cNvPr>
@@ -28590,7 +28582,7 @@
           <p:cNvPr id="5" name="Slide Number Placeholder 4">
             <a:extLst>
               <a:ext uri="{FF2B5EF4-FFF2-40B4-BE49-F238E27FC236}">
-                <a16:creationId xmlns="" xmlns:a16="http://schemas.microsoft.com/office/drawing/2014/main" id="{FC017216-2CFD-CC4E-BE9F-13606D9BD470}"/>
+                <a16:creationId xmlns:a16="http://schemas.microsoft.com/office/drawing/2014/main" xmlns="" id="{FC017216-2CFD-CC4E-BE9F-13606D9BD470}"/>
               </a:ext>
             </a:extLst>
           </p:cNvPr>
@@ -28625,7 +28617,7 @@
           <p:cNvPr id="6" name="Text Box 4">
             <a:extLst>
               <a:ext uri="{FF2B5EF4-FFF2-40B4-BE49-F238E27FC236}">
-                <a16:creationId xmlns="" xmlns:a16="http://schemas.microsoft.com/office/drawing/2014/main" id="{DAE60EF9-2CDE-E743-867F-5A3A6C49D6D8}"/>
+                <a16:creationId xmlns:a16="http://schemas.microsoft.com/office/drawing/2014/main" xmlns="" id="{DAE60EF9-2CDE-E743-867F-5A3A6C49D6D8}"/>
               </a:ext>
             </a:extLst>
           </p:cNvPr>
@@ -28868,7 +28860,7 @@
     </p:spTree>
     <p:extLst>
       <p:ext uri="{BB962C8B-B14F-4D97-AF65-F5344CB8AC3E}">
-        <p14:creationId xmlns:p14="http://schemas.microsoft.com/office/powerpoint/2010/main" val="3922669148"/>
+        <p14:creationId xmlns:p14="http://schemas.microsoft.com/office/powerpoint/2010/main" xmlns="" val="3922669148"/>
       </p:ext>
     </p:extLst>
   </p:cSld>
@@ -28876,7 +28868,7 @@
     <a:masterClrMapping/>
   </p:clrMapOvr>
   <mc:AlternateContent xmlns:mc="http://schemas.openxmlformats.org/markup-compatibility/2006">
-    <mc:Choice xmlns:p14="http://schemas.microsoft.com/office/powerpoint/2010/main" Requires="p14">
+    <mc:Choice xmlns:p14="http://schemas.microsoft.com/office/powerpoint/2010/main" xmlns="" Requires="p14">
       <p:transition spd="slow" p14:dur="2000"/>
     </mc:Choice>
     <mc:Fallback>
@@ -29245,7 +29237,7 @@
     </p:spTree>
     <p:extLst>
       <p:ext uri="{BB962C8B-B14F-4D97-AF65-F5344CB8AC3E}">
-        <p14:creationId xmlns:p14="http://schemas.microsoft.com/office/powerpoint/2010/main" val="3757249729"/>
+        <p14:creationId xmlns:p14="http://schemas.microsoft.com/office/powerpoint/2010/main" xmlns="" val="3757249729"/>
       </p:ext>
     </p:extLst>
   </p:cSld>
@@ -29253,7 +29245,7 @@
     <a:masterClrMapping/>
   </p:clrMapOvr>
   <mc:AlternateContent xmlns:mc="http://schemas.openxmlformats.org/markup-compatibility/2006">
-    <mc:Choice xmlns:p14="http://schemas.microsoft.com/office/powerpoint/2010/main" Requires="p14">
+    <mc:Choice xmlns:p14="http://schemas.microsoft.com/office/powerpoint/2010/main" xmlns="" Requires="p14">
       <p:transition spd="slow" p14:dur="2000"/>
     </mc:Choice>
     <mc:Fallback>
@@ -29637,7 +29629,7 @@
     </p:spTree>
     <p:extLst>
       <p:ext uri="{BB962C8B-B14F-4D97-AF65-F5344CB8AC3E}">
-        <p14:creationId xmlns:p14="http://schemas.microsoft.com/office/powerpoint/2010/main" val="1427427315"/>
+        <p14:creationId xmlns:p14="http://schemas.microsoft.com/office/powerpoint/2010/main" xmlns="" val="1427427315"/>
       </p:ext>
     </p:extLst>
   </p:cSld>
@@ -29669,7 +29661,7 @@
           <p:cNvPr id="2" name="Title 1">
             <a:extLst>
               <a:ext uri="{FF2B5EF4-FFF2-40B4-BE49-F238E27FC236}">
-                <a16:creationId xmlns="" xmlns:a16="http://schemas.microsoft.com/office/drawing/2014/main" id="{80C3D85E-7C8F-6E46-B90D-246CCA922C07}"/>
+                <a16:creationId xmlns:a16="http://schemas.microsoft.com/office/drawing/2014/main" xmlns="" id="{80C3D85E-7C8F-6E46-B90D-246CCA922C07}"/>
               </a:ext>
             </a:extLst>
           </p:cNvPr>
@@ -29698,7 +29690,7 @@
           <p:cNvPr id="4" name="Footer Placeholder 3">
             <a:extLst>
               <a:ext uri="{FF2B5EF4-FFF2-40B4-BE49-F238E27FC236}">
-                <a16:creationId xmlns="" xmlns:a16="http://schemas.microsoft.com/office/drawing/2014/main" id="{C9024F30-BDEC-A540-9893-1E3028DE0CAE}"/>
+                <a16:creationId xmlns:a16="http://schemas.microsoft.com/office/drawing/2014/main" xmlns="" id="{C9024F30-BDEC-A540-9893-1E3028DE0CAE}"/>
               </a:ext>
             </a:extLst>
           </p:cNvPr>
@@ -29730,7 +29722,7 @@
           <p:cNvPr id="5" name="Slide Number Placeholder 4">
             <a:extLst>
               <a:ext uri="{FF2B5EF4-FFF2-40B4-BE49-F238E27FC236}">
-                <a16:creationId xmlns="" xmlns:a16="http://schemas.microsoft.com/office/drawing/2014/main" id="{7ECFB90F-1D1E-294A-B524-D244BD1636FB}"/>
+                <a16:creationId xmlns:a16="http://schemas.microsoft.com/office/drawing/2014/main" xmlns="" id="{7ECFB90F-1D1E-294A-B524-D244BD1636FB}"/>
               </a:ext>
             </a:extLst>
           </p:cNvPr>
@@ -29774,7 +29766,7 @@
           <a:blip r:embed="rId2">
             <a:extLst>
               <a:ext uri="{28A0092B-C50C-407E-A947-70E740481C1C}">
-                <a14:useLocalDpi xmlns:a14="http://schemas.microsoft.com/office/drawing/2010/main" val="0"/>
+                <a14:useLocalDpi xmlns:a14="http://schemas.microsoft.com/office/drawing/2010/main" xmlns="" val="0"/>
               </a:ext>
             </a:extLst>
           </a:blip>
@@ -29792,7 +29784,7 @@
     </p:spTree>
     <p:extLst>
       <p:ext uri="{BB962C8B-B14F-4D97-AF65-F5344CB8AC3E}">
-        <p14:creationId xmlns:p14="http://schemas.microsoft.com/office/powerpoint/2010/main" val="1611125178"/>
+        <p14:creationId xmlns:p14="http://schemas.microsoft.com/office/powerpoint/2010/main" xmlns="" val="1611125178"/>
       </p:ext>
     </p:extLst>
   </p:cSld>
@@ -30029,7 +30021,7 @@
     </p:spTree>
     <p:extLst>
       <p:ext uri="{BB962C8B-B14F-4D97-AF65-F5344CB8AC3E}">
-        <p14:creationId xmlns:p14="http://schemas.microsoft.com/office/powerpoint/2010/main" val="3228989802"/>
+        <p14:creationId xmlns:p14="http://schemas.microsoft.com/office/powerpoint/2010/main" xmlns="" val="3228989802"/>
       </p:ext>
     </p:extLst>
   </p:cSld>
@@ -30037,7 +30029,7 @@
     <a:masterClrMapping/>
   </p:clrMapOvr>
   <mc:AlternateContent xmlns:mc="http://schemas.openxmlformats.org/markup-compatibility/2006">
-    <mc:Choice xmlns:p14="http://schemas.microsoft.com/office/powerpoint/2010/main" Requires="p14">
+    <mc:Choice xmlns:p14="http://schemas.microsoft.com/office/powerpoint/2010/main" xmlns="" Requires="p14">
       <p:transition spd="slow" p14:dur="2000"/>
     </mc:Choice>
     <mc:Fallback>
@@ -30315,7 +30307,7 @@
     </p:spTree>
     <p:extLst>
       <p:ext uri="{BB962C8B-B14F-4D97-AF65-F5344CB8AC3E}">
-        <p14:creationId xmlns:p14="http://schemas.microsoft.com/office/powerpoint/2010/main" val="498154915"/>
+        <p14:creationId xmlns:p14="http://schemas.microsoft.com/office/powerpoint/2010/main" xmlns="" val="498154915"/>
       </p:ext>
     </p:extLst>
   </p:cSld>
@@ -30347,7 +30339,7 @@
           <p:cNvPr id="2" name="Title 1">
             <a:extLst>
               <a:ext uri="{FF2B5EF4-FFF2-40B4-BE49-F238E27FC236}">
-                <a16:creationId xmlns="" xmlns:a16="http://schemas.microsoft.com/office/drawing/2014/main" id="{4664E7BD-32E1-0541-9A2F-7C6CFD099DDC}"/>
+                <a16:creationId xmlns:a16="http://schemas.microsoft.com/office/drawing/2014/main" xmlns="" id="{4664E7BD-32E1-0541-9A2F-7C6CFD099DDC}"/>
               </a:ext>
             </a:extLst>
           </p:cNvPr>
@@ -30384,7 +30376,7 @@
           <p:cNvPr id="3" name="Content Placeholder 2">
             <a:extLst>
               <a:ext uri="{FF2B5EF4-FFF2-40B4-BE49-F238E27FC236}">
-                <a16:creationId xmlns="" xmlns:a16="http://schemas.microsoft.com/office/drawing/2014/main" id="{FCD8EF3C-DE03-B04A-A8B1-733CDF56FA0E}"/>
+                <a16:creationId xmlns:a16="http://schemas.microsoft.com/office/drawing/2014/main" xmlns="" id="{FCD8EF3C-DE03-B04A-A8B1-733CDF56FA0E}"/>
               </a:ext>
             </a:extLst>
           </p:cNvPr>
@@ -30517,7 +30509,7 @@
           <p:cNvPr id="4" name="Footer Placeholder 3">
             <a:extLst>
               <a:ext uri="{FF2B5EF4-FFF2-40B4-BE49-F238E27FC236}">
-                <a16:creationId xmlns="" xmlns:a16="http://schemas.microsoft.com/office/drawing/2014/main" id="{C3373D26-8D2A-5741-8E1A-DBC4C614AFCC}"/>
+                <a16:creationId xmlns:a16="http://schemas.microsoft.com/office/drawing/2014/main" xmlns="" id="{C3373D26-8D2A-5741-8E1A-DBC4C614AFCC}"/>
               </a:ext>
             </a:extLst>
           </p:cNvPr>
@@ -30549,7 +30541,7 @@
           <p:cNvPr id="5" name="Slide Number Placeholder 4">
             <a:extLst>
               <a:ext uri="{FF2B5EF4-FFF2-40B4-BE49-F238E27FC236}">
-                <a16:creationId xmlns="" xmlns:a16="http://schemas.microsoft.com/office/drawing/2014/main" id="{006BFD47-1B80-264A-A19C-2D6F977CE98B}"/>
+                <a16:creationId xmlns:a16="http://schemas.microsoft.com/office/drawing/2014/main" xmlns="" id="{006BFD47-1B80-264A-A19C-2D6F977CE98B}"/>
               </a:ext>
             </a:extLst>
           </p:cNvPr>
@@ -30582,7 +30574,7 @@
     </p:spTree>
     <p:extLst>
       <p:ext uri="{BB962C8B-B14F-4D97-AF65-F5344CB8AC3E}">
-        <p14:creationId xmlns:p14="http://schemas.microsoft.com/office/powerpoint/2010/main" val="585200965"/>
+        <p14:creationId xmlns:p14="http://schemas.microsoft.com/office/powerpoint/2010/main" xmlns="" val="585200965"/>
       </p:ext>
     </p:extLst>
   </p:cSld>
@@ -30590,7 +30582,7 @@
     <a:masterClrMapping/>
   </p:clrMapOvr>
   <mc:AlternateContent xmlns:mc="http://schemas.openxmlformats.org/markup-compatibility/2006">
-    <mc:Choice xmlns:p14="http://schemas.microsoft.com/office/powerpoint/2010/main" Requires="p14">
+    <mc:Choice xmlns:p14="http://schemas.microsoft.com/office/powerpoint/2010/main" xmlns="" Requires="p14">
       <p:transition spd="slow" p14:dur="2000"/>
     </mc:Choice>
     <mc:Fallback>
@@ -30658,7 +30650,7 @@
           <p:cNvPr id="6" name="Rectangle 3">
             <a:extLst>
               <a:ext uri="{FF2B5EF4-FFF2-40B4-BE49-F238E27FC236}">
-                <a16:creationId xmlns="" xmlns:a16="http://schemas.microsoft.com/office/drawing/2014/main" id="{AA4B9897-13C0-3049-8823-B24C807F663F}"/>
+                <a16:creationId xmlns:a16="http://schemas.microsoft.com/office/drawing/2014/main" xmlns="" id="{AA4B9897-13C0-3049-8823-B24C807F663F}"/>
               </a:ext>
             </a:extLst>
           </p:cNvPr>
@@ -30960,7 +30952,7 @@
     </p:spTree>
     <p:extLst>
       <p:ext uri="{BB962C8B-B14F-4D97-AF65-F5344CB8AC3E}">
-        <p14:creationId xmlns:p14="http://schemas.microsoft.com/office/powerpoint/2010/main" val="749612225"/>
+        <p14:creationId xmlns:p14="http://schemas.microsoft.com/office/powerpoint/2010/main" xmlns="" val="749612225"/>
       </p:ext>
     </p:extLst>
   </p:cSld>

</xml_diff>